<commit_message>
add auto line break
</commit_message>
<xml_diff>
--- a/finishedppt/WorshipSongs.pptx
+++ b/finishedppt/WorshipSongs.pptx
@@ -3109,7 +3109,7 @@
           <a:lstStyle/>
           <a:p>
             <a:r>
-              <a:t>จงสรรเสริญพระเจ้าเถิด</a:t>
+              <a:t>พระคุณพระเจ้า</a:t>
             </a:r>
           </a:p>
         </p:txBody>
@@ -3128,7 +3128,11 @@
         <p:txBody>
           <a:bodyPr/>
           <a:lstStyle/>
-          <a:p/>
+          <a:p>
+            <a:r>
+              <a:t>Amazing Grace</a:t>
+            </a:r>
+          </a:p>
         </p:txBody>
       </p:sp>
     </p:spTree>
@@ -3157,8 +3161,8 @@
         </p:nvSpPr>
         <p:spPr>
           <a:xfrm>
-            <a:off x="914400" y="457200"/>
-            <a:ext cx="7315200" cy="5486400"/>
+            <a:off x="914400" y="228600"/>
+            <a:ext cx="7315200" cy="2971800"/>
           </a:xfrm>
           <a:prstGeom prst="rect">
             <a:avLst/>
@@ -3173,14 +3177,50 @@
           <a:p/>
           <a:p>
             <a:pPr algn="ctr">
-              <a:defRPr sz="3500">
+              <a:defRPr sz="5000">
                 <a:solidFill>
                   <a:srgbClr val="000000"/>
                 </a:solidFill>
               </a:defRPr>
             </a:pPr>
             <a:r>
-              <a:t>จงสรรเสริญพระเจ้าเถิด เปล่งเสียงโห่ร้องถวาย จงเข้าไปในพระวิหาร และนมัสการพระองค์ พระองค์ทรงสร้างทุกสิ่ง ขึ้นด้วยฝีพระหัตถ์ พระนามพระองค์ยิ่งใหญ่ สมควรสรรเสริญ</a:t>
+              <a:t>พระคุณพระเจ้านั้นแสนชื่นใจ ช่วยได้คนชั่วอย่างฉัน ครั้งนั้นฉันหลงพระองค์ตามหา ตาบอดแต่ฉันเห็นแล้ว</a:t>
+            </a:r>
+          </a:p>
+        </p:txBody>
+      </p:sp>
+      <p:sp>
+        <p:nvSpPr>
+          <p:cNvPr id="3" name="TextBox 2"/>
+          <p:cNvSpPr txBox="1"/>
+          <p:nvPr/>
+        </p:nvSpPr>
+        <p:spPr>
+          <a:xfrm>
+            <a:off x="914400" y="3657600"/>
+            <a:ext cx="7315200" cy="2971800"/>
+          </a:xfrm>
+          <a:prstGeom prst="rect">
+            <a:avLst/>
+          </a:prstGeom>
+          <a:noFill/>
+        </p:spPr>
+        <p:txBody>
+          <a:bodyPr wrap="square">
+            <a:spAutoFit/>
+          </a:bodyPr>
+          <a:lstStyle/>
+          <a:p/>
+          <a:p>
+            <a:pPr algn="ctr">
+              <a:defRPr sz="3500">
+                <a:solidFill>
+                  <a:srgbClr val="3A70BC"/>
+                </a:solidFill>
+              </a:defRPr>
+            </a:pPr>
+            <a:r>
+              <a:t>AMAZING GRACE HOW SWEET THE SOUND THAT SAVED A WRETCH LIKE ME! I ONCE WAS LOST, BUT NOW AM FOUND WAS BLIND, BUT NOW I SEE</a:t>
             </a:r>
           </a:p>
         </p:txBody>
@@ -3211,8 +3251,8 @@
         </p:nvSpPr>
         <p:spPr>
           <a:xfrm>
-            <a:off x="914400" y="457200"/>
-            <a:ext cx="7315200" cy="5486400"/>
+            <a:off x="914400" y="228600"/>
+            <a:ext cx="7315200" cy="2971800"/>
           </a:xfrm>
           <a:prstGeom prst="rect">
             <a:avLst/>
@@ -3227,14 +3267,50 @@
           <a:p/>
           <a:p>
             <a:pPr algn="ctr">
-              <a:defRPr sz="3500">
+              <a:defRPr sz="5000">
                 <a:solidFill>
                   <a:srgbClr val="000000"/>
                 </a:solidFill>
               </a:defRPr>
             </a:pPr>
             <a:r>
-              <a:t>ให้ทุกสิ่งที่อยู่ใต้ฟ้า ร้องสรรเสริญพระนามพระองค์ ยกย่องความยิ่งใหญ่ ของพระองค์ร่วมกัน ร้องเพลงและเต้นรำถวาย สรรเสริญพระนามเกรียงไกร ทุก ๆ สิ่งที่หายใจ จงสรรเสริญพระเจ้า</a:t>
+              <a:t>บ่วงมารวางไว้ทุกข์ภัยหลายอย่าง ตามทางฉันพ้นมาแล้ว แต่เพราะพระคุณฉันจึงคลาดแคล้ว พระองค์นำฉันกลับบ้าน</a:t>
+            </a:r>
+          </a:p>
+        </p:txBody>
+      </p:sp>
+      <p:sp>
+        <p:nvSpPr>
+          <p:cNvPr id="3" name="TextBox 2"/>
+          <p:cNvSpPr txBox="1"/>
+          <p:nvPr/>
+        </p:nvSpPr>
+        <p:spPr>
+          <a:xfrm>
+            <a:off x="914400" y="3657600"/>
+            <a:ext cx="7315200" cy="2971800"/>
+          </a:xfrm>
+          <a:prstGeom prst="rect">
+            <a:avLst/>
+          </a:prstGeom>
+          <a:noFill/>
+        </p:spPr>
+        <p:txBody>
+          <a:bodyPr wrap="square">
+            <a:spAutoFit/>
+          </a:bodyPr>
+          <a:lstStyle/>
+          <a:p/>
+          <a:p>
+            <a:pPr algn="ctr">
+              <a:defRPr sz="3500">
+                <a:solidFill>
+                  <a:srgbClr val="3A70BC"/>
+                </a:solidFill>
+              </a:defRPr>
+            </a:pPr>
+            <a:r>
+              <a:t>Twas grace that taught my heart to fear, And grace my fears relieved; How precious did that grace appear the hour I first believed.</a:t>
             </a:r>
           </a:p>
         </p:txBody>
@@ -3259,42 +3335,73 @@
       <p:grpSpPr/>
       <p:sp>
         <p:nvSpPr>
-          <p:cNvPr id="2" name="Title 1"/>
-          <p:cNvSpPr>
-            <a:spLocks noGrp="1"/>
-          </p:cNvSpPr>
-          <p:nvPr>
-            <p:ph type="ctrTitle"/>
-          </p:nvPr>
-        </p:nvSpPr>
-        <p:spPr/>
-        <p:txBody>
-          <a:bodyPr/>
-          <a:lstStyle/>
-          <a:p>
-            <a:r>
-              <a:t>มานี่เป็นเวลานมัสการ</a:t>
-            </a:r>
-          </a:p>
-        </p:txBody>
-      </p:sp>
-      <p:sp>
-        <p:nvSpPr>
-          <p:cNvPr id="3" name="Subtitle 2"/>
-          <p:cNvSpPr>
-            <a:spLocks noGrp="1"/>
-          </p:cNvSpPr>
-          <p:nvPr>
-            <p:ph type="subTitle" idx="1"/>
-          </p:nvPr>
-        </p:nvSpPr>
-        <p:spPr/>
-        <p:txBody>
-          <a:bodyPr/>
-          <a:lstStyle/>
-          <a:p>
-            <a:r>
-              <a:t>Come Now is the Time to Worship</a:t>
+          <p:cNvPr id="2" name="TextBox 1"/>
+          <p:cNvSpPr txBox="1"/>
+          <p:nvPr/>
+        </p:nvSpPr>
+        <p:spPr>
+          <a:xfrm>
+            <a:off x="914400" y="228600"/>
+            <a:ext cx="7315200" cy="2971800"/>
+          </a:xfrm>
+          <a:prstGeom prst="rect">
+            <a:avLst/>
+          </a:prstGeom>
+          <a:noFill/>
+        </p:spPr>
+        <p:txBody>
+          <a:bodyPr wrap="square">
+            <a:spAutoFit/>
+          </a:bodyPr>
+          <a:lstStyle/>
+          <a:p/>
+          <a:p>
+            <a:pPr algn="ctr">
+              <a:defRPr sz="5000">
+                <a:solidFill>
+                  <a:srgbClr val="000000"/>
+                </a:solidFill>
+              </a:defRPr>
+            </a:pPr>
+            <a:r>
+              <a:t>พระคุณสอนให้ใจฉันยำเกรง เร่งให้ความกลัวต้องหนี พระคุณอันเลิศประเสริฐยิ่งใหญ่ ไม่มีหมู่มารได้ชัย</a:t>
+            </a:r>
+            <a:br/>
+          </a:p>
+        </p:txBody>
+      </p:sp>
+      <p:sp>
+        <p:nvSpPr>
+          <p:cNvPr id="3" name="TextBox 2"/>
+          <p:cNvSpPr txBox="1"/>
+          <p:nvPr/>
+        </p:nvSpPr>
+        <p:spPr>
+          <a:xfrm>
+            <a:off x="914400" y="3657600"/>
+            <a:ext cx="7315200" cy="2971800"/>
+          </a:xfrm>
+          <a:prstGeom prst="rect">
+            <a:avLst/>
+          </a:prstGeom>
+          <a:noFill/>
+        </p:spPr>
+        <p:txBody>
+          <a:bodyPr wrap="square">
+            <a:spAutoFit/>
+          </a:bodyPr>
+          <a:lstStyle/>
+          <a:p/>
+          <a:p>
+            <a:pPr algn="ctr">
+              <a:defRPr sz="3500">
+                <a:solidFill>
+                  <a:srgbClr val="3A70BC"/>
+                </a:solidFill>
+              </a:defRPr>
+            </a:pPr>
+            <a:r>
+              <a:t>Through many dangers, toils and snares, I have already come. 'tis grace that brought me safe thus far, and grace will lead us home.</a:t>
             </a:r>
           </a:p>
         </p:txBody>
@@ -3341,14 +3448,14 @@
           <a:p/>
           <a:p>
             <a:pPr algn="ctr">
-              <a:defRPr sz="3500">
+              <a:defRPr sz="5000">
                 <a:solidFill>
                   <a:srgbClr val="000000"/>
                 </a:solidFill>
               </a:defRPr>
             </a:pPr>
             <a:r>
-              <a:t>มา นี่เป็นเวลานมัสการ มา นี่เป็นเวลาถวายดวงใจ มา นมัสการดั่งที่เป็น มา ต่อหน้าพระองค์ดั่งที่เราเป็น มา</a:t>
+              <a:t>พระเจ้าประทานแต่สิ่งที่ดี พระธรรมให้มีความหวัง พระองค์คุ้มครองป้องกันทุกที เมื่อมีสิ่งชั่วบีฑา</a:t>
             </a:r>
           </a:p>
         </p:txBody>
@@ -3384,7 +3491,7 @@
               </a:defRPr>
             </a:pPr>
             <a:r>
-              <a:t>Come now is the time to worship. Come now is the time to give your heart. Come just as you are to worship. Come just as you are before your God. Come</a:t>
+              <a:t>The Lord hath promised good to me, His word my hope secures; He will my shield and portion be As long as life endures.</a:t>
             </a:r>
           </a:p>
         </p:txBody>
@@ -3424,21 +3531,29 @@
           <a:noFill/>
         </p:spPr>
         <p:txBody>
-          <a:bodyPr wrap="square">
+          <a:bodyPr wrap="none">
             <a:spAutoFit/>
           </a:bodyPr>
           <a:lstStyle/>
           <a:p/>
           <a:p>
             <a:pPr algn="ctr">
-              <a:defRPr sz="3500">
+              <a:defRPr sz="5000">
                 <a:solidFill>
                   <a:srgbClr val="000000"/>
                 </a:solidFill>
               </a:defRPr>
             </a:pPr>
             <a:r>
-              <a:t>สักวันทุกลิ้นจะยอมรับว่าทรงเป็นพระเจ้า สักวันทุกเข่าจะก้มกราบลง แต่ทรัพย์สมบัติล้ำค่าจะเป็นของบรรดา ผู้เลือกและรับพระองค์</a:t>
+              <a:t>เมื่อเราได้ไปอยู่เมืองสวรรค์</a:t>
+            </a:r>
+            <a:br/>
+            <a:r>
+              <a:t>ช้านานนับหลายพันปี ยังมีเวลาร้องเพลงสรรเสริญ</a:t>
+            </a:r>
+            <a:br/>
+            <a:r>
+              <a:t>เท่ากันกับเมื่อเริ่มต้น</a:t>
             </a:r>
           </a:p>
         </p:txBody>
@@ -3474,7 +3589,7 @@
               </a:defRPr>
             </a:pPr>
             <a:r>
-              <a:t>One day every tongue, Will confess You are God. One day every knee will bow. Still the greatest treasure remains, For those who gladly choose You now.</a:t>
+              <a:t>When we’ve been there ten thousand years, Bright shining as the sun, We’ve no less days to sing God’s praise Than when we first begun</a:t>
             </a:r>
           </a:p>
         </p:txBody>

</xml_diff>

<commit_message>
add auto line break for English
</commit_message>
<xml_diff>
--- a/finishedppt/WorshipSongs.pptx
+++ b/finishedppt/WorshipSongs.pptx
@@ -8,9 +8,6 @@
     <p:sldId id="256" r:id="rId7"/>
     <p:sldId id="257" r:id="rId8"/>
     <p:sldId id="258" r:id="rId9"/>
-    <p:sldId id="259" r:id="rId10"/>
-    <p:sldId id="260" r:id="rId11"/>
-    <p:sldId id="261" r:id="rId12"/>
   </p:sldIdLst>
   <p:sldSz cx="9144000" cy="6858000" type="screen4x3"/>
   <p:notesSz cx="6858000" cy="9144000"/>
@@ -3109,7 +3106,7 @@
           <a:lstStyle/>
           <a:p>
             <a:r>
-              <a:t>พระคุณพระเจ้า</a:t>
+              <a:t>ขอบพระคุณด้วยใจโมทนา</a:t>
             </a:r>
           </a:p>
         </p:txBody>
@@ -3130,7 +3127,7 @@
           <a:lstStyle/>
           <a:p>
             <a:r>
-              <a:t>Amazing Grace</a:t>
+              <a:t>Give Thanks</a:t>
             </a:r>
           </a:p>
         </p:txBody>
@@ -3170,21 +3167,29 @@
           <a:noFill/>
         </p:spPr>
         <p:txBody>
-          <a:bodyPr wrap="square">
+          <a:bodyPr wrap="none">
             <a:spAutoFit/>
           </a:bodyPr>
           <a:lstStyle/>
           <a:p/>
           <a:p>
             <a:pPr algn="ctr">
-              <a:defRPr sz="5000">
+              <a:defRPr sz="3500">
                 <a:solidFill>
                   <a:srgbClr val="000000"/>
                 </a:solidFill>
               </a:defRPr>
             </a:pPr>
             <a:r>
-              <a:t>พระคุณพระเจ้านั้นแสนชื่นใจ ช่วยได้คนชั่วอย่างฉัน ครั้งนั้นฉันหลงพระองค์ตามหา ตาบอดแต่ฉันเห็นแล้ว</a:t>
+              <a:t>ขอบพระคุณด้วยใจโมทนา ขอบพระคุณแด่องค์บริสุทธิ์</a:t>
+            </a:r>
+            <a:br/>
+            <a:r>
+              <a:t>ขอบพระคุณที่พระองค์ประทาน</a:t>
+            </a:r>
+            <a:br/>
+            <a:r>
+              <a:t>พระเยซู พระบุตร</a:t>
             </a:r>
           </a:p>
         </p:txBody>
@@ -3206,7 +3211,7 @@
           <a:noFill/>
         </p:spPr>
         <p:txBody>
-          <a:bodyPr wrap="square">
+          <a:bodyPr wrap="none">
             <a:spAutoFit/>
           </a:bodyPr>
           <a:lstStyle/>
@@ -3220,7 +3225,19 @@
               </a:defRPr>
             </a:pPr>
             <a:r>
-              <a:t>AMAZING GRACE HOW SWEET THE SOUND THAT SAVED A WRETCH LIKE ME! I ONCE WAS LOST, BUT NOW AM FOUND WAS BLIND, BUT NOW I SEE</a:t>
+              <a:t>Give thanks with a grateful heart</a:t>
+            </a:r>
+            <a:br/>
+            <a:r>
+              <a:t> Give thanks to the Holy One</a:t>
+            </a:r>
+            <a:br/>
+            <a:r>
+              <a:t> Give thanks because He's given Jesus Christ</a:t>
+            </a:r>
+            <a:br/>
+            <a:r>
+              <a:t> His Son.</a:t>
             </a:r>
           </a:p>
         </p:txBody>
@@ -3260,21 +3277,29 @@
           <a:noFill/>
         </p:spPr>
         <p:txBody>
-          <a:bodyPr wrap="square">
+          <a:bodyPr wrap="none">
             <a:spAutoFit/>
           </a:bodyPr>
           <a:lstStyle/>
           <a:p/>
           <a:p>
             <a:pPr algn="ctr">
-              <a:defRPr sz="5000">
+              <a:defRPr sz="3500">
                 <a:solidFill>
                   <a:srgbClr val="000000"/>
                 </a:solidFill>
               </a:defRPr>
             </a:pPr>
             <a:r>
-              <a:t>บ่วงมารวางไว้ทุกข์ภัยหลายอย่าง ตามทางฉันพ้นมาแล้ว แต่เพราะพระคุณฉันจึงคลาดแคล้ว พระองค์นำฉันกลับบ้าน</a:t>
+              <a:t>เดี๋ยวนี้ ให้ผู้อ่อนแอกล่าวว่าเข้มแข็ง</a:t>
+            </a:r>
+            <a:br/>
+            <a:r>
+              <a:t>ให้ผู้ขัดสนกลับเป็นมั่งมี</a:t>
+            </a:r>
+            <a:br/>
+            <a:r>
+              <a:t>เพราะพระองค์ทรง ประทานสิ่งดีเพื่อเรา</a:t>
             </a:r>
           </a:p>
         </p:txBody>
@@ -3296,7 +3321,7 @@
           <a:noFill/>
         </p:spPr>
         <p:txBody>
-          <a:bodyPr wrap="square">
+          <a:bodyPr wrap="none">
             <a:spAutoFit/>
           </a:bodyPr>
           <a:lstStyle/>
@@ -3310,287 +3335,17 @@
               </a:defRPr>
             </a:pPr>
             <a:r>
-              <a:t>Twas grace that taught my heart to fear, And grace my fears relieved; How precious did that grace appear the hour I first believed.</a:t>
-            </a:r>
-          </a:p>
-        </p:txBody>
-      </p:sp>
-    </p:spTree>
-  </p:cSld>
-  <p:clrMapOvr>
-    <a:masterClrMapping/>
-  </p:clrMapOvr>
-</p:sld>
-</file>
-
-<file path=ppt/slides/slide4.xml><?xml version="1.0" encoding="utf-8"?>
-<p:sld xmlns:a="http://schemas.openxmlformats.org/drawingml/2006/main" xmlns:p="http://schemas.openxmlformats.org/presentationml/2006/main" xmlns:r="http://schemas.openxmlformats.org/officeDocument/2006/relationships">
-  <p:cSld>
-    <p:spTree>
-      <p:nvGrpSpPr>
-        <p:cNvPr id="1" name=""/>
-        <p:cNvGrpSpPr/>
-        <p:nvPr/>
-      </p:nvGrpSpPr>
-      <p:grpSpPr/>
-      <p:sp>
-        <p:nvSpPr>
-          <p:cNvPr id="2" name="TextBox 1"/>
-          <p:cNvSpPr txBox="1"/>
-          <p:nvPr/>
-        </p:nvSpPr>
-        <p:spPr>
-          <a:xfrm>
-            <a:off x="914400" y="228600"/>
-            <a:ext cx="7315200" cy="2971800"/>
-          </a:xfrm>
-          <a:prstGeom prst="rect">
-            <a:avLst/>
-          </a:prstGeom>
-          <a:noFill/>
-        </p:spPr>
-        <p:txBody>
-          <a:bodyPr wrap="square">
-            <a:spAutoFit/>
-          </a:bodyPr>
-          <a:lstStyle/>
-          <a:p/>
-          <a:p>
-            <a:pPr algn="ctr">
-              <a:defRPr sz="5000">
-                <a:solidFill>
-                  <a:srgbClr val="000000"/>
-                </a:solidFill>
-              </a:defRPr>
-            </a:pPr>
-            <a:r>
-              <a:t>พระคุณสอนให้ใจฉันยำเกรง เร่งให้ความกลัวต้องหนี พระคุณอันเลิศประเสริฐยิ่งใหญ่ ไม่มีหมู่มารได้ชัย</a:t>
+              <a:t>And now let the weak say, I am strong</a:t>
             </a:r>
             <a:br/>
-          </a:p>
-        </p:txBody>
-      </p:sp>
-      <p:sp>
-        <p:nvSpPr>
-          <p:cNvPr id="3" name="TextBox 2"/>
-          <p:cNvSpPr txBox="1"/>
-          <p:nvPr/>
-        </p:nvSpPr>
-        <p:spPr>
-          <a:xfrm>
-            <a:off x="914400" y="3657600"/>
-            <a:ext cx="7315200" cy="2971800"/>
-          </a:xfrm>
-          <a:prstGeom prst="rect">
-            <a:avLst/>
-          </a:prstGeom>
-          <a:noFill/>
-        </p:spPr>
-        <p:txBody>
-          <a:bodyPr wrap="square">
-            <a:spAutoFit/>
-          </a:bodyPr>
-          <a:lstStyle/>
-          <a:p/>
-          <a:p>
-            <a:pPr algn="ctr">
-              <a:defRPr sz="3500">
-                <a:solidFill>
-                  <a:srgbClr val="3A70BC"/>
-                </a:solidFill>
-              </a:defRPr>
-            </a:pPr>
-            <a:r>
-              <a:t>Through many dangers, toils and snares, I have already come. 'tis grace that brought me safe thus far, and grace will lead us home.</a:t>
-            </a:r>
-          </a:p>
-        </p:txBody>
-      </p:sp>
-    </p:spTree>
-  </p:cSld>
-  <p:clrMapOvr>
-    <a:masterClrMapping/>
-  </p:clrMapOvr>
-</p:sld>
-</file>
-
-<file path=ppt/slides/slide5.xml><?xml version="1.0" encoding="utf-8"?>
-<p:sld xmlns:a="http://schemas.openxmlformats.org/drawingml/2006/main" xmlns:p="http://schemas.openxmlformats.org/presentationml/2006/main" xmlns:r="http://schemas.openxmlformats.org/officeDocument/2006/relationships">
-  <p:cSld>
-    <p:spTree>
-      <p:nvGrpSpPr>
-        <p:cNvPr id="1" name=""/>
-        <p:cNvGrpSpPr/>
-        <p:nvPr/>
-      </p:nvGrpSpPr>
-      <p:grpSpPr/>
-      <p:sp>
-        <p:nvSpPr>
-          <p:cNvPr id="2" name="TextBox 1"/>
-          <p:cNvSpPr txBox="1"/>
-          <p:nvPr/>
-        </p:nvSpPr>
-        <p:spPr>
-          <a:xfrm>
-            <a:off x="914400" y="228600"/>
-            <a:ext cx="7315200" cy="2971800"/>
-          </a:xfrm>
-          <a:prstGeom prst="rect">
-            <a:avLst/>
-          </a:prstGeom>
-          <a:noFill/>
-        </p:spPr>
-        <p:txBody>
-          <a:bodyPr wrap="square">
-            <a:spAutoFit/>
-          </a:bodyPr>
-          <a:lstStyle/>
-          <a:p/>
-          <a:p>
-            <a:pPr algn="ctr">
-              <a:defRPr sz="5000">
-                <a:solidFill>
-                  <a:srgbClr val="000000"/>
-                </a:solidFill>
-              </a:defRPr>
-            </a:pPr>
-            <a:r>
-              <a:t>พระเจ้าประทานแต่สิ่งที่ดี พระธรรมให้มีความหวัง พระองค์คุ้มครองป้องกันทุกที เมื่อมีสิ่งชั่วบีฑา</a:t>
-            </a:r>
-          </a:p>
-        </p:txBody>
-      </p:sp>
-      <p:sp>
-        <p:nvSpPr>
-          <p:cNvPr id="3" name="TextBox 2"/>
-          <p:cNvSpPr txBox="1"/>
-          <p:nvPr/>
-        </p:nvSpPr>
-        <p:spPr>
-          <a:xfrm>
-            <a:off x="914400" y="3657600"/>
-            <a:ext cx="7315200" cy="2971800"/>
-          </a:xfrm>
-          <a:prstGeom prst="rect">
-            <a:avLst/>
-          </a:prstGeom>
-          <a:noFill/>
-        </p:spPr>
-        <p:txBody>
-          <a:bodyPr wrap="square">
-            <a:spAutoFit/>
-          </a:bodyPr>
-          <a:lstStyle/>
-          <a:p/>
-          <a:p>
-            <a:pPr algn="ctr">
-              <a:defRPr sz="3500">
-                <a:solidFill>
-                  <a:srgbClr val="3A70BC"/>
-                </a:solidFill>
-              </a:defRPr>
-            </a:pPr>
-            <a:r>
-              <a:t>The Lord hath promised good to me, His word my hope secures; He will my shield and portion be As long as life endures.</a:t>
-            </a:r>
-          </a:p>
-        </p:txBody>
-      </p:sp>
-    </p:spTree>
-  </p:cSld>
-  <p:clrMapOvr>
-    <a:masterClrMapping/>
-  </p:clrMapOvr>
-</p:sld>
-</file>
-
-<file path=ppt/slides/slide6.xml><?xml version="1.0" encoding="utf-8"?>
-<p:sld xmlns:a="http://schemas.openxmlformats.org/drawingml/2006/main" xmlns:p="http://schemas.openxmlformats.org/presentationml/2006/main" xmlns:r="http://schemas.openxmlformats.org/officeDocument/2006/relationships">
-  <p:cSld>
-    <p:spTree>
-      <p:nvGrpSpPr>
-        <p:cNvPr id="1" name=""/>
-        <p:cNvGrpSpPr/>
-        <p:nvPr/>
-      </p:nvGrpSpPr>
-      <p:grpSpPr/>
-      <p:sp>
-        <p:nvSpPr>
-          <p:cNvPr id="2" name="TextBox 1"/>
-          <p:cNvSpPr txBox="1"/>
-          <p:nvPr/>
-        </p:nvSpPr>
-        <p:spPr>
-          <a:xfrm>
-            <a:off x="914400" y="228600"/>
-            <a:ext cx="7315200" cy="2971800"/>
-          </a:xfrm>
-          <a:prstGeom prst="rect">
-            <a:avLst/>
-          </a:prstGeom>
-          <a:noFill/>
-        </p:spPr>
-        <p:txBody>
-          <a:bodyPr wrap="none">
-            <a:spAutoFit/>
-          </a:bodyPr>
-          <a:lstStyle/>
-          <a:p/>
-          <a:p>
-            <a:pPr algn="ctr">
-              <a:defRPr sz="5000">
-                <a:solidFill>
-                  <a:srgbClr val="000000"/>
-                </a:solidFill>
-              </a:defRPr>
-            </a:pPr>
-            <a:r>
-              <a:t>เมื่อเราได้ไปอยู่เมืองสวรรค์</a:t>
+            <a:r>
+              <a:t> Let the poor say, I am rich</a:t>
             </a:r>
             <a:br/>
             <a:r>
-              <a:t>ช้านานนับหลายพันปี ยังมีเวลาร้องเพลงสรรเสริญ</a:t>
+              <a:t> Because of what the Lord has done for us</a:t>
             </a:r>
             <a:br/>
-            <a:r>
-              <a:t>เท่ากันกับเมื่อเริ่มต้น</a:t>
-            </a:r>
-          </a:p>
-        </p:txBody>
-      </p:sp>
-      <p:sp>
-        <p:nvSpPr>
-          <p:cNvPr id="3" name="TextBox 2"/>
-          <p:cNvSpPr txBox="1"/>
-          <p:nvPr/>
-        </p:nvSpPr>
-        <p:spPr>
-          <a:xfrm>
-            <a:off x="914400" y="3657600"/>
-            <a:ext cx="7315200" cy="2971800"/>
-          </a:xfrm>
-          <a:prstGeom prst="rect">
-            <a:avLst/>
-          </a:prstGeom>
-          <a:noFill/>
-        </p:spPr>
-        <p:txBody>
-          <a:bodyPr wrap="square">
-            <a:spAutoFit/>
-          </a:bodyPr>
-          <a:lstStyle/>
-          <a:p/>
-          <a:p>
-            <a:pPr algn="ctr">
-              <a:defRPr sz="3500">
-                <a:solidFill>
-                  <a:srgbClr val="3A70BC"/>
-                </a:solidFill>
-              </a:defRPr>
-            </a:pPr>
-            <a:r>
-              <a:t>When we’ve been there ten thousand years, Bright shining as the sun, We’ve no less days to sing God’s praise Than when we first begun</a:t>
-            </a:r>
           </a:p>
         </p:txBody>
       </p:sp>

</xml_diff>

<commit_message>
added line spacing options
</commit_message>
<xml_diff>
--- a/finishedppt/WorshipSongs.pptx
+++ b/finishedppt/WorshipSongs.pptx
@@ -7,22 +7,6 @@
   <p:sldIdLst>
     <p:sldId id="256" r:id="rId7"/>
     <p:sldId id="257" r:id="rId8"/>
-    <p:sldId id="258" r:id="rId9"/>
-    <p:sldId id="259" r:id="rId10"/>
-    <p:sldId id="260" r:id="rId11"/>
-    <p:sldId id="261" r:id="rId12"/>
-    <p:sldId id="262" r:id="rId13"/>
-    <p:sldId id="263" r:id="rId14"/>
-    <p:sldId id="264" r:id="rId15"/>
-    <p:sldId id="265" r:id="rId16"/>
-    <p:sldId id="266" r:id="rId17"/>
-    <p:sldId id="267" r:id="rId18"/>
-    <p:sldId id="268" r:id="rId19"/>
-    <p:sldId id="269" r:id="rId20"/>
-    <p:sldId id="270" r:id="rId21"/>
-    <p:sldId id="271" r:id="rId22"/>
-    <p:sldId id="272" r:id="rId23"/>
-    <p:sldId id="273" r:id="rId24"/>
   </p:sldIdLst>
   <p:sldSz cx="9144000" cy="6858000" type="screen4x3"/>
   <p:notesSz cx="6858000" cy="9144000"/>
@@ -3121,7 +3105,7 @@
           <a:lstStyle/>
           <a:p>
             <a:r>
-              <a:t>จงสรรเสริญพระเจ้าเถิด</a:t>
+              <a:t>ความรักมั่นคง</a:t>
             </a:r>
           </a:p>
         </p:txBody>
@@ -3141,600 +3125,6 @@
           <a:bodyPr/>
           <a:lstStyle/>
           <a:p/>
-        </p:txBody>
-      </p:sp>
-    </p:spTree>
-  </p:cSld>
-  <p:clrMapOvr>
-    <a:masterClrMapping/>
-  </p:clrMapOvr>
-</p:sld>
-</file>
-
-<file path=ppt/slides/slide10.xml><?xml version="1.0" encoding="utf-8"?>
-<p:sld xmlns:a="http://schemas.openxmlformats.org/drawingml/2006/main" xmlns:p="http://schemas.openxmlformats.org/presentationml/2006/main" xmlns:r="http://schemas.openxmlformats.org/officeDocument/2006/relationships">
-  <p:cSld>
-    <p:spTree>
-      <p:nvGrpSpPr>
-        <p:cNvPr id="1" name=""/>
-        <p:cNvGrpSpPr/>
-        <p:nvPr/>
-      </p:nvGrpSpPr>
-      <p:grpSpPr/>
-      <p:sp>
-        <p:nvSpPr>
-          <p:cNvPr id="2" name="Title 1"/>
-          <p:cNvSpPr>
-            <a:spLocks noGrp="1"/>
-          </p:cNvSpPr>
-          <p:nvPr>
-            <p:ph type="ctrTitle"/>
-          </p:nvPr>
-        </p:nvSpPr>
-        <p:spPr/>
-        <p:txBody>
-          <a:bodyPr/>
-          <a:lstStyle/>
-          <a:p>
-            <a:r>
-              <a:t>ความรักมั่นคง</a:t>
-            </a:r>
-          </a:p>
-        </p:txBody>
-      </p:sp>
-      <p:sp>
-        <p:nvSpPr>
-          <p:cNvPr id="3" name="Subtitle 2"/>
-          <p:cNvSpPr>
-            <a:spLocks noGrp="1"/>
-          </p:cNvSpPr>
-          <p:nvPr>
-            <p:ph type="subTitle" idx="1"/>
-          </p:nvPr>
-        </p:nvSpPr>
-        <p:spPr/>
-        <p:txBody>
-          <a:bodyPr/>
-          <a:lstStyle/>
-          <a:p>
-            <a:r>
-              <a:t>The steadfast love of the Lord</a:t>
-            </a:r>
-          </a:p>
-        </p:txBody>
-      </p:sp>
-    </p:spTree>
-  </p:cSld>
-  <p:clrMapOvr>
-    <a:masterClrMapping/>
-  </p:clrMapOvr>
-</p:sld>
-</file>
-
-<file path=ppt/slides/slide11.xml><?xml version="1.0" encoding="utf-8"?>
-<p:sld xmlns:a="http://schemas.openxmlformats.org/drawingml/2006/main" xmlns:p="http://schemas.openxmlformats.org/presentationml/2006/main" xmlns:r="http://schemas.openxmlformats.org/officeDocument/2006/relationships">
-  <p:cSld>
-    <p:spTree>
-      <p:nvGrpSpPr>
-        <p:cNvPr id="1" name=""/>
-        <p:cNvGrpSpPr/>
-        <p:nvPr/>
-      </p:nvGrpSpPr>
-      <p:grpSpPr/>
-      <p:sp>
-        <p:nvSpPr>
-          <p:cNvPr id="2" name="TextBox 1"/>
-          <p:cNvSpPr txBox="1"/>
-          <p:nvPr/>
-        </p:nvSpPr>
-        <p:spPr>
-          <a:xfrm>
-            <a:off x="914400" y="228600"/>
-            <a:ext cx="7315200" cy="2971800"/>
-          </a:xfrm>
-          <a:prstGeom prst="rect">
-            <a:avLst/>
-          </a:prstGeom>
-          <a:noFill/>
-        </p:spPr>
-        <p:txBody>
-          <a:bodyPr wrap="square">
-            <a:spAutoFit/>
-          </a:bodyPr>
-          <a:lstStyle/>
-          <a:p/>
-          <a:p>
-            <a:pPr algn="ctr">
-              <a:defRPr sz="4000">
-                <a:solidFill>
-                  <a:srgbClr val="000000"/>
-                </a:solidFill>
-              </a:defRPr>
-            </a:pPr>
-            <a:r>
-              <a:t>ความรักมั่นคงของพระเจ้าไม่เคยยั้งหยุด พระเมตตาคุณหลั่งลงมาอยู่เสมอ ใหม่ทุกเช้าเร้าในดวงใจ ซาบซึ้งทุก ๆ วันใหม่ พระองค์ทรงความเที่ยงตรงยิ่งนัก พระองค์ทรงความเที่ยงตรง</a:t>
-            </a:r>
-          </a:p>
-        </p:txBody>
-      </p:sp>
-      <p:sp>
-        <p:nvSpPr>
-          <p:cNvPr id="3" name="TextBox 2"/>
-          <p:cNvSpPr txBox="1"/>
-          <p:nvPr/>
-        </p:nvSpPr>
-        <p:spPr>
-          <a:xfrm>
-            <a:off x="914400" y="3657600"/>
-            <a:ext cx="7315200" cy="2971800"/>
-          </a:xfrm>
-          <a:prstGeom prst="rect">
-            <a:avLst/>
-          </a:prstGeom>
-          <a:noFill/>
-        </p:spPr>
-        <p:txBody>
-          <a:bodyPr wrap="square">
-            <a:spAutoFit/>
-          </a:bodyPr>
-          <a:lstStyle/>
-          <a:p/>
-          <a:p>
-            <a:pPr algn="ctr">
-              <a:defRPr sz="3500">
-                <a:solidFill>
-                  <a:srgbClr val="3A70BC"/>
-                </a:solidFill>
-              </a:defRPr>
-            </a:pPr>
-            <a:r>
-              <a:t>The steadfast love of the Lord never ceases; God’s mercies never come to an end. They are new every morning, new every morning; great is your faithfulness, O Lord, great is your faithfulness.</a:t>
-            </a:r>
-          </a:p>
-        </p:txBody>
-      </p:sp>
-    </p:spTree>
-  </p:cSld>
-  <p:clrMapOvr>
-    <a:masterClrMapping/>
-  </p:clrMapOvr>
-</p:sld>
-</file>
-
-<file path=ppt/slides/slide12.xml><?xml version="1.0" encoding="utf-8"?>
-<p:sld xmlns:a="http://schemas.openxmlformats.org/drawingml/2006/main" xmlns:p="http://schemas.openxmlformats.org/presentationml/2006/main" xmlns:r="http://schemas.openxmlformats.org/officeDocument/2006/relationships">
-  <p:cSld>
-    <p:spTree>
-      <p:nvGrpSpPr>
-        <p:cNvPr id="1" name=""/>
-        <p:cNvGrpSpPr/>
-        <p:nvPr/>
-      </p:nvGrpSpPr>
-      <p:grpSpPr/>
-      <p:sp>
-        <p:nvSpPr>
-          <p:cNvPr id="2" name="Title 1"/>
-          <p:cNvSpPr>
-            <a:spLocks noGrp="1"/>
-          </p:cNvSpPr>
-          <p:nvPr>
-            <p:ph type="ctrTitle"/>
-          </p:nvPr>
-        </p:nvSpPr>
-        <p:spPr/>
-        <p:txBody>
-          <a:bodyPr/>
-          <a:lstStyle/>
-          <a:p/>
-        </p:txBody>
-      </p:sp>
-      <p:sp>
-        <p:nvSpPr>
-          <p:cNvPr id="3" name="Subtitle 2"/>
-          <p:cNvSpPr>
-            <a:spLocks noGrp="1"/>
-          </p:cNvSpPr>
-          <p:nvPr>
-            <p:ph type="subTitle" idx="1"/>
-          </p:nvPr>
-        </p:nvSpPr>
-        <p:spPr/>
-        <p:txBody>
-          <a:bodyPr/>
-          <a:lstStyle/>
-          <a:p>
-            <a:r>
-              <a:t>How Great Is Our God</a:t>
-            </a:r>
-          </a:p>
-        </p:txBody>
-      </p:sp>
-    </p:spTree>
-  </p:cSld>
-  <p:clrMapOvr>
-    <a:masterClrMapping/>
-  </p:clrMapOvr>
-</p:sld>
-</file>
-
-<file path=ppt/slides/slide13.xml><?xml version="1.0" encoding="utf-8"?>
-<p:sld xmlns:a="http://schemas.openxmlformats.org/drawingml/2006/main" xmlns:p="http://schemas.openxmlformats.org/presentationml/2006/main" xmlns:r="http://schemas.openxmlformats.org/officeDocument/2006/relationships">
-  <p:cSld>
-    <p:spTree>
-      <p:nvGrpSpPr>
-        <p:cNvPr id="1" name=""/>
-        <p:cNvGrpSpPr/>
-        <p:nvPr/>
-      </p:nvGrpSpPr>
-      <p:grpSpPr/>
-      <p:sp>
-        <p:nvSpPr>
-          <p:cNvPr id="2" name="TextBox 1"/>
-          <p:cNvSpPr txBox="1"/>
-          <p:nvPr/>
-        </p:nvSpPr>
-        <p:spPr>
-          <a:xfrm>
-            <a:off x="914400" y="457200"/>
-            <a:ext cx="7315200" cy="5486400"/>
-          </a:xfrm>
-          <a:prstGeom prst="rect">
-            <a:avLst/>
-          </a:prstGeom>
-          <a:noFill/>
-        </p:spPr>
-        <p:txBody>
-          <a:bodyPr wrap="square">
-            <a:spAutoFit/>
-          </a:bodyPr>
-          <a:lstStyle/>
-          <a:p/>
-          <a:p>
-            <a:pPr algn="ctr">
-              <a:defRPr sz="4000">
-                <a:solidFill>
-                  <a:srgbClr val="000000"/>
-                </a:solidFill>
-              </a:defRPr>
-            </a:pPr>
-            <a:r>
-              <a:t>The splendor of a King, clothed in majesty. Let all the earth rejoice. All the earth rejoice. He wraps himself in Light, and darkness tries to hide. And trembles at His voice. Trembles at His voice.</a:t>
-            </a:r>
-          </a:p>
-        </p:txBody>
-      </p:sp>
-    </p:spTree>
-  </p:cSld>
-  <p:clrMapOvr>
-    <a:masterClrMapping/>
-  </p:clrMapOvr>
-</p:sld>
-</file>
-
-<file path=ppt/slides/slide14.xml><?xml version="1.0" encoding="utf-8"?>
-<p:sld xmlns:a="http://schemas.openxmlformats.org/drawingml/2006/main" xmlns:p="http://schemas.openxmlformats.org/presentationml/2006/main" xmlns:r="http://schemas.openxmlformats.org/officeDocument/2006/relationships">
-  <p:cSld>
-    <p:spTree>
-      <p:nvGrpSpPr>
-        <p:cNvPr id="1" name=""/>
-        <p:cNvGrpSpPr/>
-        <p:nvPr/>
-      </p:nvGrpSpPr>
-      <p:grpSpPr/>
-      <p:sp>
-        <p:nvSpPr>
-          <p:cNvPr id="2" name="TextBox 1"/>
-          <p:cNvSpPr txBox="1"/>
-          <p:nvPr/>
-        </p:nvSpPr>
-        <p:spPr>
-          <a:xfrm>
-            <a:off x="914400" y="457200"/>
-            <a:ext cx="7315200" cy="5486400"/>
-          </a:xfrm>
-          <a:prstGeom prst="rect">
-            <a:avLst/>
-          </a:prstGeom>
-          <a:noFill/>
-        </p:spPr>
-        <p:txBody>
-          <a:bodyPr wrap="none">
-            <a:spAutoFit/>
-          </a:bodyPr>
-          <a:lstStyle/>
-          <a:p/>
-          <a:p>
-            <a:pPr algn="ctr">
-              <a:defRPr sz="4000">
-                <a:solidFill>
-                  <a:srgbClr val="000000"/>
-                </a:solidFill>
-              </a:defRPr>
-            </a:pPr>
-            <a:r>
-              <a:t>How great is our God</a:t>
-            </a:r>
-            <a:br/>
-            <a:r>
-              <a:t> sing with me</a:t>
-            </a:r>
-            <a:br/>
-            <a:r>
-              <a:t> How great is our God</a:t>
-            </a:r>
-            <a:br/>
-            <a:r>
-              <a:t> and all will see</a:t>
-            </a:r>
-            <a:br/>
-            <a:r>
-              <a:t> How great, how great is our God</a:t>
-            </a:r>
-            <a:br/>
-          </a:p>
-        </p:txBody>
-      </p:sp>
-    </p:spTree>
-  </p:cSld>
-  <p:clrMapOvr>
-    <a:masterClrMapping/>
-  </p:clrMapOvr>
-</p:sld>
-</file>
-
-<file path=ppt/slides/slide15.xml><?xml version="1.0" encoding="utf-8"?>
-<p:sld xmlns:a="http://schemas.openxmlformats.org/drawingml/2006/main" xmlns:p="http://schemas.openxmlformats.org/presentationml/2006/main" xmlns:r="http://schemas.openxmlformats.org/officeDocument/2006/relationships">
-  <p:cSld>
-    <p:spTree>
-      <p:nvGrpSpPr>
-        <p:cNvPr id="1" name=""/>
-        <p:cNvGrpSpPr/>
-        <p:nvPr/>
-      </p:nvGrpSpPr>
-      <p:grpSpPr/>
-      <p:sp>
-        <p:nvSpPr>
-          <p:cNvPr id="2" name="TextBox 1"/>
-          <p:cNvSpPr txBox="1"/>
-          <p:nvPr/>
-        </p:nvSpPr>
-        <p:spPr>
-          <a:xfrm>
-            <a:off x="914400" y="457200"/>
-            <a:ext cx="7315200" cy="5486400"/>
-          </a:xfrm>
-          <a:prstGeom prst="rect">
-            <a:avLst/>
-          </a:prstGeom>
-          <a:noFill/>
-        </p:spPr>
-        <p:txBody>
-          <a:bodyPr wrap="square">
-            <a:spAutoFit/>
-          </a:bodyPr>
-          <a:lstStyle/>
-          <a:p/>
-          <a:p>
-            <a:pPr algn="ctr">
-              <a:defRPr sz="4000">
-                <a:solidFill>
-                  <a:srgbClr val="000000"/>
-                </a:solidFill>
-              </a:defRPr>
-            </a:pPr>
-            <a:r>
-              <a:t>Age to age He stands. And time is in His hands. Beginning and the end. Beginning and the end. The Godhead Three in One. Father Spirit Son. The Lion and the Lamb. The Lion and the Lamb.</a:t>
-            </a:r>
-          </a:p>
-        </p:txBody>
-      </p:sp>
-    </p:spTree>
-  </p:cSld>
-  <p:clrMapOvr>
-    <a:masterClrMapping/>
-  </p:clrMapOvr>
-</p:sld>
-</file>
-
-<file path=ppt/slides/slide16.xml><?xml version="1.0" encoding="utf-8"?>
-<p:sld xmlns:a="http://schemas.openxmlformats.org/drawingml/2006/main" xmlns:p="http://schemas.openxmlformats.org/presentationml/2006/main" xmlns:r="http://schemas.openxmlformats.org/officeDocument/2006/relationships">
-  <p:cSld>
-    <p:spTree>
-      <p:nvGrpSpPr>
-        <p:cNvPr id="1" name=""/>
-        <p:cNvGrpSpPr/>
-        <p:nvPr/>
-      </p:nvGrpSpPr>
-      <p:grpSpPr/>
-      <p:sp>
-        <p:nvSpPr>
-          <p:cNvPr id="2" name="TextBox 1"/>
-          <p:cNvSpPr txBox="1"/>
-          <p:nvPr/>
-        </p:nvSpPr>
-        <p:spPr>
-          <a:xfrm>
-            <a:off x="914400" y="457200"/>
-            <a:ext cx="7315200" cy="5486400"/>
-          </a:xfrm>
-          <a:prstGeom prst="rect">
-            <a:avLst/>
-          </a:prstGeom>
-          <a:noFill/>
-        </p:spPr>
-        <p:txBody>
-          <a:bodyPr wrap="none">
-            <a:spAutoFit/>
-          </a:bodyPr>
-          <a:lstStyle/>
-          <a:p/>
-          <a:p>
-            <a:pPr algn="ctr">
-              <a:defRPr sz="4000">
-                <a:solidFill>
-                  <a:srgbClr val="000000"/>
-                </a:solidFill>
-              </a:defRPr>
-            </a:pPr>
-            <a:r>
-              <a:t>How great is our God</a:t>
-            </a:r>
-            <a:br/>
-            <a:r>
-              <a:t> sing with me</a:t>
-            </a:r>
-            <a:br/>
-            <a:r>
-              <a:t> How great is our God</a:t>
-            </a:r>
-            <a:br/>
-            <a:r>
-              <a:t> and all will see</a:t>
-            </a:r>
-            <a:br/>
-            <a:r>
-              <a:t> How great, how great is our God</a:t>
-            </a:r>
-            <a:br/>
-          </a:p>
-        </p:txBody>
-      </p:sp>
-    </p:spTree>
-  </p:cSld>
-  <p:clrMapOvr>
-    <a:masterClrMapping/>
-  </p:clrMapOvr>
-</p:sld>
-</file>
-
-<file path=ppt/slides/slide17.xml><?xml version="1.0" encoding="utf-8"?>
-<p:sld xmlns:a="http://schemas.openxmlformats.org/drawingml/2006/main" xmlns:p="http://schemas.openxmlformats.org/presentationml/2006/main" xmlns:r="http://schemas.openxmlformats.org/officeDocument/2006/relationships">
-  <p:cSld>
-    <p:spTree>
-      <p:nvGrpSpPr>
-        <p:cNvPr id="1" name=""/>
-        <p:cNvGrpSpPr/>
-        <p:nvPr/>
-      </p:nvGrpSpPr>
-      <p:grpSpPr/>
-      <p:sp>
-        <p:nvSpPr>
-          <p:cNvPr id="2" name="TextBox 1"/>
-          <p:cNvSpPr txBox="1"/>
-          <p:nvPr/>
-        </p:nvSpPr>
-        <p:spPr>
-          <a:xfrm>
-            <a:off x="914400" y="457200"/>
-            <a:ext cx="7315200" cy="5486400"/>
-          </a:xfrm>
-          <a:prstGeom prst="rect">
-            <a:avLst/>
-          </a:prstGeom>
-          <a:noFill/>
-        </p:spPr>
-        <p:txBody>
-          <a:bodyPr wrap="none">
-            <a:spAutoFit/>
-          </a:bodyPr>
-          <a:lstStyle/>
-          <a:p/>
-          <a:p>
-            <a:pPr algn="ctr">
-              <a:defRPr sz="4000">
-                <a:solidFill>
-                  <a:srgbClr val="000000"/>
-                </a:solidFill>
-              </a:defRPr>
-            </a:pPr>
-            <a:r>
-              <a:t>Name above all names</a:t>
-            </a:r>
-            <a:br/>
-            <a:r>
-              <a:t> Worthy of our praise</a:t>
-            </a:r>
-            <a:br/>
-            <a:r>
-              <a:t> My heart will sing</a:t>
-            </a:r>
-            <a:br/>
-            <a:r>
-              <a:t> How great is our God</a:t>
-            </a:r>
-            <a:br/>
-          </a:p>
-        </p:txBody>
-      </p:sp>
-    </p:spTree>
-  </p:cSld>
-  <p:clrMapOvr>
-    <a:masterClrMapping/>
-  </p:clrMapOvr>
-</p:sld>
-</file>
-
-<file path=ppt/slides/slide18.xml><?xml version="1.0" encoding="utf-8"?>
-<p:sld xmlns:a="http://schemas.openxmlformats.org/drawingml/2006/main" xmlns:p="http://schemas.openxmlformats.org/presentationml/2006/main" xmlns:r="http://schemas.openxmlformats.org/officeDocument/2006/relationships">
-  <p:cSld>
-    <p:spTree>
-      <p:nvGrpSpPr>
-        <p:cNvPr id="1" name=""/>
-        <p:cNvGrpSpPr/>
-        <p:nvPr/>
-      </p:nvGrpSpPr>
-      <p:grpSpPr/>
-      <p:sp>
-        <p:nvSpPr>
-          <p:cNvPr id="2" name="TextBox 1"/>
-          <p:cNvSpPr txBox="1"/>
-          <p:nvPr/>
-        </p:nvSpPr>
-        <p:spPr>
-          <a:xfrm>
-            <a:off x="914400" y="457200"/>
-            <a:ext cx="7315200" cy="5486400"/>
-          </a:xfrm>
-          <a:prstGeom prst="rect">
-            <a:avLst/>
-          </a:prstGeom>
-          <a:noFill/>
-        </p:spPr>
-        <p:txBody>
-          <a:bodyPr wrap="none">
-            <a:spAutoFit/>
-          </a:bodyPr>
-          <a:lstStyle/>
-          <a:p/>
-          <a:p>
-            <a:pPr algn="ctr">
-              <a:defRPr sz="4000">
-                <a:solidFill>
-                  <a:srgbClr val="000000"/>
-                </a:solidFill>
-              </a:defRPr>
-            </a:pPr>
-            <a:r>
-              <a:t>How great is our God</a:t>
-            </a:r>
-            <a:br/>
-            <a:r>
-              <a:t> sing with me</a:t>
-            </a:r>
-            <a:br/>
-            <a:r>
-              <a:t> How great is our God</a:t>
-            </a:r>
-            <a:br/>
-            <a:r>
-              <a:t> and all will see</a:t>
-            </a:r>
-            <a:br/>
-            <a:r>
-              <a:t> How great, how great is our God</a:t>
-            </a:r>
-            <a:br/>
-          </a:p>
         </p:txBody>
       </p:sp>
     </p:spTree>
@@ -3772,516 +3162,24 @@
           <a:noFill/>
         </p:spPr>
         <p:txBody>
-          <a:bodyPr wrap="none">
+          <a:bodyPr wrap="square">
             <a:spAutoFit/>
           </a:bodyPr>
           <a:lstStyle/>
           <a:p/>
           <a:p>
             <a:pPr algn="ctr">
-              <a:defRPr sz="4000">
+              <a:lnSpc>
+                <a:spcPts val="7300"/>
+              </a:lnSpc>
+              <a:defRPr sz="7700">
                 <a:solidFill>
                   <a:srgbClr val="000000"/>
                 </a:solidFill>
               </a:defRPr>
             </a:pPr>
             <a:r>
-              <a:t>จงสรรเสริญพระเจ้าเถิด</a:t>
-            </a:r>
-            <a:br/>
-            <a:r>
-              <a:t>เปล่งเสียงโห่ร้องถวาย</a:t>
-            </a:r>
-            <a:br/>
-            <a:r>
-              <a:t>จงเข้าไปในพระวิหาร และนมัสการพระองค์</a:t>
-            </a:r>
-            <a:br/>
-            <a:r>
-              <a:t>พระองค์ทรงสร้างทุกสิ่ง</a:t>
-            </a:r>
-            <a:br/>
-            <a:r>
-              <a:t>ขึ้นด้วยฝีพระหัตถ์ พระนามพระองค์ยิ่งใหญ่</a:t>
-            </a:r>
-            <a:br/>
-            <a:r>
-              <a:t>สมควรสรรเสริญ</a:t>
-            </a:r>
-          </a:p>
-        </p:txBody>
-      </p:sp>
-    </p:spTree>
-  </p:cSld>
-  <p:clrMapOvr>
-    <a:masterClrMapping/>
-  </p:clrMapOvr>
-</p:sld>
-</file>
-
-<file path=ppt/slides/slide3.xml><?xml version="1.0" encoding="utf-8"?>
-<p:sld xmlns:a="http://schemas.openxmlformats.org/drawingml/2006/main" xmlns:p="http://schemas.openxmlformats.org/presentationml/2006/main" xmlns:r="http://schemas.openxmlformats.org/officeDocument/2006/relationships">
-  <p:cSld>
-    <p:spTree>
-      <p:nvGrpSpPr>
-        <p:cNvPr id="1" name=""/>
-        <p:cNvGrpSpPr/>
-        <p:nvPr/>
-      </p:nvGrpSpPr>
-      <p:grpSpPr/>
-      <p:sp>
-        <p:nvSpPr>
-          <p:cNvPr id="2" name="TextBox 1"/>
-          <p:cNvSpPr txBox="1"/>
-          <p:nvPr/>
-        </p:nvSpPr>
-        <p:spPr>
-          <a:xfrm>
-            <a:off x="914400" y="457200"/>
-            <a:ext cx="7315200" cy="5486400"/>
-          </a:xfrm>
-          <a:prstGeom prst="rect">
-            <a:avLst/>
-          </a:prstGeom>
-          <a:noFill/>
-        </p:spPr>
-        <p:txBody>
-          <a:bodyPr wrap="none">
-            <a:spAutoFit/>
-          </a:bodyPr>
-          <a:lstStyle/>
-          <a:p/>
-          <a:p>
-            <a:pPr algn="ctr">
-              <a:defRPr sz="4000">
-                <a:solidFill>
-                  <a:srgbClr val="000000"/>
-                </a:solidFill>
-              </a:defRPr>
-            </a:pPr>
-            <a:r>
-              <a:t>ให้ทุกสิ่งที่อยู่ใต้ฟ้า</a:t>
-            </a:r>
-            <a:br/>
-            <a:r>
-              <a:t>ร้องสรรเสริญพระนามพระองค์</a:t>
-            </a:r>
-            <a:br/>
-            <a:r>
-              <a:t>ยกย่องความยิ่งใหญ่ ของพระองค์ร่วมกัน</a:t>
-            </a:r>
-            <a:br/>
-            <a:r>
-              <a:t>ร้องเพลงและเต้นรำถวาย</a:t>
-            </a:r>
-            <a:br/>
-            <a:r>
-              <a:t>สรรเสริญพระนามเกรียงไกร</a:t>
-            </a:r>
-            <a:br/>
-            <a:r>
-              <a:t>ทุก ๆ สิ่งที่หายใจ จงสรรเสริญพระเจ้า</a:t>
-            </a:r>
-          </a:p>
-        </p:txBody>
-      </p:sp>
-    </p:spTree>
-  </p:cSld>
-  <p:clrMapOvr>
-    <a:masterClrMapping/>
-  </p:clrMapOvr>
-</p:sld>
-</file>
-
-<file path=ppt/slides/slide4.xml><?xml version="1.0" encoding="utf-8"?>
-<p:sld xmlns:a="http://schemas.openxmlformats.org/drawingml/2006/main" xmlns:p="http://schemas.openxmlformats.org/presentationml/2006/main" xmlns:r="http://schemas.openxmlformats.org/officeDocument/2006/relationships">
-  <p:cSld>
-    <p:spTree>
-      <p:nvGrpSpPr>
-        <p:cNvPr id="1" name=""/>
-        <p:cNvGrpSpPr/>
-        <p:nvPr/>
-      </p:nvGrpSpPr>
-      <p:grpSpPr/>
-      <p:sp>
-        <p:nvSpPr>
-          <p:cNvPr id="2" name="Title 1"/>
-          <p:cNvSpPr>
-            <a:spLocks noGrp="1"/>
-          </p:cNvSpPr>
-          <p:nvPr>
-            <p:ph type="ctrTitle"/>
-          </p:nvPr>
-        </p:nvSpPr>
-        <p:spPr/>
-        <p:txBody>
-          <a:bodyPr/>
-          <a:lstStyle/>
-          <a:p/>
-        </p:txBody>
-      </p:sp>
-      <p:sp>
-        <p:nvSpPr>
-          <p:cNvPr id="3" name="Subtitle 2"/>
-          <p:cNvSpPr>
-            <a:spLocks noGrp="1"/>
-          </p:cNvSpPr>
-          <p:nvPr>
-            <p:ph type="subTitle" idx="1"/>
-          </p:nvPr>
-        </p:nvSpPr>
-        <p:spPr/>
-        <p:txBody>
-          <a:bodyPr/>
-          <a:lstStyle/>
-          <a:p>
-            <a:r>
-              <a:t>Forever</a:t>
-            </a:r>
-          </a:p>
-        </p:txBody>
-      </p:sp>
-    </p:spTree>
-  </p:cSld>
-  <p:clrMapOvr>
-    <a:masterClrMapping/>
-  </p:clrMapOvr>
-</p:sld>
-</file>
-
-<file path=ppt/slides/slide5.xml><?xml version="1.0" encoding="utf-8"?>
-<p:sld xmlns:a="http://schemas.openxmlformats.org/drawingml/2006/main" xmlns:p="http://schemas.openxmlformats.org/presentationml/2006/main" xmlns:r="http://schemas.openxmlformats.org/officeDocument/2006/relationships">
-  <p:cSld>
-    <p:spTree>
-      <p:nvGrpSpPr>
-        <p:cNvPr id="1" name=""/>
-        <p:cNvGrpSpPr/>
-        <p:nvPr/>
-      </p:nvGrpSpPr>
-      <p:grpSpPr/>
-      <p:sp>
-        <p:nvSpPr>
-          <p:cNvPr id="2" name="TextBox 1"/>
-          <p:cNvSpPr txBox="1"/>
-          <p:nvPr/>
-        </p:nvSpPr>
-        <p:spPr>
-          <a:xfrm>
-            <a:off x="914400" y="457200"/>
-            <a:ext cx="7315200" cy="5486400"/>
-          </a:xfrm>
-          <a:prstGeom prst="rect">
-            <a:avLst/>
-          </a:prstGeom>
-          <a:noFill/>
-        </p:spPr>
-        <p:txBody>
-          <a:bodyPr wrap="none">
-            <a:spAutoFit/>
-          </a:bodyPr>
-          <a:lstStyle/>
-          <a:p/>
-          <a:p>
-            <a:pPr algn="ctr">
-              <a:defRPr sz="4000">
-                <a:solidFill>
-                  <a:srgbClr val="000000"/>
-                </a:solidFill>
-              </a:defRPr>
-            </a:pPr>
-            <a:r>
-              <a:t>Give thanks to the Lord our God and King</a:t>
-            </a:r>
-            <a:br/>
-            <a:r>
-              <a:t> His love endures forever</a:t>
-            </a:r>
-            <a:br/>
-            <a:r>
-              <a:t> For He is good, He is above all things</a:t>
-            </a:r>
-            <a:br/>
-            <a:r>
-              <a:t> His love endures forever</a:t>
-            </a:r>
-            <a:br/>
-            <a:r>
-              <a:t> Sing praise, sing praise</a:t>
-            </a:r>
-            <a:br/>
-          </a:p>
-        </p:txBody>
-      </p:sp>
-    </p:spTree>
-  </p:cSld>
-  <p:clrMapOvr>
-    <a:masterClrMapping/>
-  </p:clrMapOvr>
-</p:sld>
-</file>
-
-<file path=ppt/slides/slide6.xml><?xml version="1.0" encoding="utf-8"?>
-<p:sld xmlns:a="http://schemas.openxmlformats.org/drawingml/2006/main" xmlns:p="http://schemas.openxmlformats.org/presentationml/2006/main" xmlns:r="http://schemas.openxmlformats.org/officeDocument/2006/relationships">
-  <p:cSld>
-    <p:spTree>
-      <p:nvGrpSpPr>
-        <p:cNvPr id="1" name=""/>
-        <p:cNvGrpSpPr/>
-        <p:nvPr/>
-      </p:nvGrpSpPr>
-      <p:grpSpPr/>
-      <p:sp>
-        <p:nvSpPr>
-          <p:cNvPr id="2" name="TextBox 1"/>
-          <p:cNvSpPr txBox="1"/>
-          <p:nvPr/>
-        </p:nvSpPr>
-        <p:spPr>
-          <a:xfrm>
-            <a:off x="914400" y="457200"/>
-            <a:ext cx="7315200" cy="5486400"/>
-          </a:xfrm>
-          <a:prstGeom prst="rect">
-            <a:avLst/>
-          </a:prstGeom>
-          <a:noFill/>
-        </p:spPr>
-        <p:txBody>
-          <a:bodyPr wrap="none">
-            <a:spAutoFit/>
-          </a:bodyPr>
-          <a:lstStyle/>
-          <a:p/>
-          <a:p>
-            <a:pPr algn="ctr">
-              <a:defRPr sz="4000">
-                <a:solidFill>
-                  <a:srgbClr val="000000"/>
-                </a:solidFill>
-              </a:defRPr>
-            </a:pPr>
-            <a:r>
-              <a:t>With a mighty hand and outstretched arm</a:t>
-            </a:r>
-            <a:br/>
-            <a:r>
-              <a:t> His love endures forever</a:t>
-            </a:r>
-            <a:br/>
-            <a:r>
-              <a:t> For the life that’s been reborn</a:t>
-            </a:r>
-            <a:br/>
-            <a:r>
-              <a:t> His love endures forever</a:t>
-            </a:r>
-            <a:br/>
-            <a:r>
-              <a:t> Sing praise, sing praise</a:t>
-            </a:r>
-            <a:br/>
-          </a:p>
-        </p:txBody>
-      </p:sp>
-    </p:spTree>
-  </p:cSld>
-  <p:clrMapOvr>
-    <a:masterClrMapping/>
-  </p:clrMapOvr>
-</p:sld>
-</file>
-
-<file path=ppt/slides/slide7.xml><?xml version="1.0" encoding="utf-8"?>
-<p:sld xmlns:a="http://schemas.openxmlformats.org/drawingml/2006/main" xmlns:p="http://schemas.openxmlformats.org/presentationml/2006/main" xmlns:r="http://schemas.openxmlformats.org/officeDocument/2006/relationships">
-  <p:cSld>
-    <p:spTree>
-      <p:nvGrpSpPr>
-        <p:cNvPr id="1" name=""/>
-        <p:cNvGrpSpPr/>
-        <p:nvPr/>
-      </p:nvGrpSpPr>
-      <p:grpSpPr/>
-      <p:sp>
-        <p:nvSpPr>
-          <p:cNvPr id="2" name="TextBox 1"/>
-          <p:cNvSpPr txBox="1"/>
-          <p:nvPr/>
-        </p:nvSpPr>
-        <p:spPr>
-          <a:xfrm>
-            <a:off x="914400" y="457200"/>
-            <a:ext cx="7315200" cy="5486400"/>
-          </a:xfrm>
-          <a:prstGeom prst="rect">
-            <a:avLst/>
-          </a:prstGeom>
-          <a:noFill/>
-        </p:spPr>
-        <p:txBody>
-          <a:bodyPr wrap="none">
-            <a:spAutoFit/>
-          </a:bodyPr>
-          <a:lstStyle/>
-          <a:p/>
-          <a:p>
-            <a:pPr algn="ctr">
-              <a:defRPr sz="4000">
-                <a:solidFill>
-                  <a:srgbClr val="000000"/>
-                </a:solidFill>
-              </a:defRPr>
-            </a:pPr>
-            <a:r>
-              <a:t>Forever God is faithful</a:t>
-            </a:r>
-            <a:br/>
-            <a:r>
-              <a:t> Forever God is strong</a:t>
-            </a:r>
-            <a:br/>
-            <a:r>
-              <a:t> Forever God is with us</a:t>
-            </a:r>
-            <a:br/>
-            <a:r>
-              <a:t> Forever</a:t>
-            </a:r>
-          </a:p>
-        </p:txBody>
-      </p:sp>
-    </p:spTree>
-  </p:cSld>
-  <p:clrMapOvr>
-    <a:masterClrMapping/>
-  </p:clrMapOvr>
-</p:sld>
-</file>
-
-<file path=ppt/slides/slide8.xml><?xml version="1.0" encoding="utf-8"?>
-<p:sld xmlns:a="http://schemas.openxmlformats.org/drawingml/2006/main" xmlns:p="http://schemas.openxmlformats.org/presentationml/2006/main" xmlns:r="http://schemas.openxmlformats.org/officeDocument/2006/relationships">
-  <p:cSld>
-    <p:spTree>
-      <p:nvGrpSpPr>
-        <p:cNvPr id="1" name=""/>
-        <p:cNvGrpSpPr/>
-        <p:nvPr/>
-      </p:nvGrpSpPr>
-      <p:grpSpPr/>
-      <p:sp>
-        <p:nvSpPr>
-          <p:cNvPr id="2" name="TextBox 1"/>
-          <p:cNvSpPr txBox="1"/>
-          <p:nvPr/>
-        </p:nvSpPr>
-        <p:spPr>
-          <a:xfrm>
-            <a:off x="914400" y="457200"/>
-            <a:ext cx="7315200" cy="5486400"/>
-          </a:xfrm>
-          <a:prstGeom prst="rect">
-            <a:avLst/>
-          </a:prstGeom>
-          <a:noFill/>
-        </p:spPr>
-        <p:txBody>
-          <a:bodyPr wrap="none">
-            <a:spAutoFit/>
-          </a:bodyPr>
-          <a:lstStyle/>
-          <a:p/>
-          <a:p>
-            <a:pPr algn="ctr">
-              <a:defRPr sz="4000">
-                <a:solidFill>
-                  <a:srgbClr val="000000"/>
-                </a:solidFill>
-              </a:defRPr>
-            </a:pPr>
-            <a:r>
-              <a:t>From the rising to the setting sun</a:t>
-            </a:r>
-            <a:br/>
-            <a:r>
-              <a:t> His love endures forever</a:t>
-            </a:r>
-            <a:br/>
-            <a:r>
-              <a:t> By the grace of God we will carry on</a:t>
-            </a:r>
-            <a:br/>
-            <a:r>
-              <a:t> His love endures forever</a:t>
-            </a:r>
-            <a:br/>
-            <a:r>
-              <a:t> Sing praise, sing praise</a:t>
-            </a:r>
-            <a:br/>
-          </a:p>
-        </p:txBody>
-      </p:sp>
-    </p:spTree>
-  </p:cSld>
-  <p:clrMapOvr>
-    <a:masterClrMapping/>
-  </p:clrMapOvr>
-</p:sld>
-</file>
-
-<file path=ppt/slides/slide9.xml><?xml version="1.0" encoding="utf-8"?>
-<p:sld xmlns:a="http://schemas.openxmlformats.org/drawingml/2006/main" xmlns:p="http://schemas.openxmlformats.org/presentationml/2006/main" xmlns:r="http://schemas.openxmlformats.org/officeDocument/2006/relationships">
-  <p:cSld>
-    <p:spTree>
-      <p:nvGrpSpPr>
-        <p:cNvPr id="1" name=""/>
-        <p:cNvGrpSpPr/>
-        <p:nvPr/>
-      </p:nvGrpSpPr>
-      <p:grpSpPr/>
-      <p:sp>
-        <p:nvSpPr>
-          <p:cNvPr id="2" name="TextBox 1"/>
-          <p:cNvSpPr txBox="1"/>
-          <p:nvPr/>
-        </p:nvSpPr>
-        <p:spPr>
-          <a:xfrm>
-            <a:off x="914400" y="457200"/>
-            <a:ext cx="7315200" cy="5486400"/>
-          </a:xfrm>
-          <a:prstGeom prst="rect">
-            <a:avLst/>
-          </a:prstGeom>
-          <a:noFill/>
-        </p:spPr>
-        <p:txBody>
-          <a:bodyPr wrap="none">
-            <a:spAutoFit/>
-          </a:bodyPr>
-          <a:lstStyle/>
-          <a:p/>
-          <a:p>
-            <a:pPr algn="ctr">
-              <a:defRPr sz="4000">
-                <a:solidFill>
-                  <a:srgbClr val="000000"/>
-                </a:solidFill>
-              </a:defRPr>
-            </a:pPr>
-            <a:r>
-              <a:t>Forever God is faithful</a:t>
-            </a:r>
-            <a:br/>
-            <a:r>
-              <a:t> Forever God is strong</a:t>
-            </a:r>
-            <a:br/>
-            <a:r>
-              <a:t> Forever God is with us</a:t>
-            </a:r>
-            <a:br/>
-            <a:r>
-              <a:t> Forever</a:t>
+              <a:t>ความรักมั่นคงของพระเจ้าไม่เคยยั้งหยุด พระเมตตาคุณหลั่งลงมาอยู่เสมอ ใหม่ทุกเช้าเร้าในดวงใจ ซาบซึ้งทุก ๆ วันใหม่ พระองค์ทรงความเที่ยงตรงยิ่งนัก พระองค์ทรงความเที่ยงตรง</a:t>
             </a:r>
           </a:p>
         </p:txBody>

</xml_diff>

<commit_message>
add songs and tools
</commit_message>
<xml_diff>
--- a/finishedppt/WorshipSongs.pptx
+++ b/finishedppt/WorshipSongs.pptx
@@ -3108,7 +3108,7 @@
           <a:lstStyle/>
           <a:p>
             <a:r>
-              <a:t>บัญญัติรัก</a:t>
+              <a:t>คริสตมาสเป็นเวลา</a:t>
             </a:r>
           </a:p>
         </p:txBody>
@@ -3180,28 +3180,36 @@
           <a:p>
             <a:pPr algn="ctr">
               <a:lnSpc>
-                <a:spcPts val="7000"/>
+                <a:spcPts val="4800"/>
               </a:lnSpc>
-              <a:defRPr sz="5000">
+              <a:defRPr sz="4000">
                 <a:solidFill>
                   <a:srgbClr val="000000"/>
                 </a:solidFill>
               </a:defRPr>
             </a:pPr>
             <a:r>
-              <a:t>ยามเราอยู่ร่วมกัน</a:t>
+              <a:t>คริสตมาสเป็นเวลาคริสตมาสเป็นเวลา</a:t>
             </a:r>
             <a:br/>
             <a:r>
-              <a:t>เราจะช่วยเหลือกัน</a:t>
+              <a:t>คริสตมาสเป็นเวลาแห่งความรัก(2)</a:t>
             </a:r>
             <a:br/>
             <a:r>
-              <a:t>ทุกข์สุขปัญหาใด</a:t>
+              <a:t>บ่อยครั้งที่เรามัวกลุ้มใจทิ้งให้ชีวิตหม่นหมอง</a:t>
             </a:r>
             <a:br/>
             <a:r>
-              <a:t>จับมือกันก้าวไป</a:t>
+              <a:t>เฝ้ามองมีใครบ้างไหมที่จะเข้าใจ</a:t>
+            </a:r>
+            <a:br/>
+            <a:r>
+              <a:t>ข่าวดีวันนี้พระเจ้าให้สายใยใจรักผูกพัน</a:t>
+            </a:r>
+            <a:br/>
+            <a:r>
+              <a:t>พระเยซูบังเกิดในรางหญ้า</a:t>
             </a:r>
           </a:p>
         </p:txBody>
@@ -3226,59 +3234,47 @@
       <p:grpSpPr/>
       <p:sp>
         <p:nvSpPr>
-          <p:cNvPr id="2" name="TextBox 1"/>
-          <p:cNvSpPr txBox="1"/>
-          <p:nvPr/>
-        </p:nvSpPr>
-        <p:spPr>
-          <a:xfrm>
-            <a:off x="914400" y="457200"/>
-            <a:ext cx="7315200" cy="5486400"/>
-          </a:xfrm>
-          <a:prstGeom prst="rect">
-            <a:avLst/>
-          </a:prstGeom>
-          <a:noFill/>
-        </p:spPr>
-        <p:txBody>
-          <a:bodyPr wrap="none">
-            <a:spAutoFit/>
-          </a:bodyPr>
-          <a:lstStyle/>
-          <a:p>
-            <a:pPr algn="ctr">
-              <a:lnSpc>
-                <a:spcPts val="7000"/>
-              </a:lnSpc>
-              <a:defRPr sz="5000">
+          <p:cNvPr id="2" name="Title 1"/>
+          <p:cNvSpPr>
+            <a:spLocks noGrp="1"/>
+          </p:cNvSpPr>
+          <p:nvPr>
+            <p:ph type="ctrTitle"/>
+          </p:nvPr>
+        </p:nvSpPr>
+        <p:spPr/>
+        <p:txBody>
+          <a:bodyPr/>
+          <a:lstStyle/>
+          <a:p>
+            <a:r>
+              <a:t>ฉันเกิดมาเพื่อสรรเสริญ</a:t>
+            </a:r>
+          </a:p>
+        </p:txBody>
+      </p:sp>
+      <p:sp>
+        <p:nvSpPr>
+          <p:cNvPr id="3" name="Subtitle 2"/>
+          <p:cNvSpPr>
+            <a:spLocks noGrp="1"/>
+          </p:cNvSpPr>
+          <p:nvPr>
+            <p:ph type="subTitle" idx="1"/>
+          </p:nvPr>
+        </p:nvSpPr>
+        <p:spPr/>
+        <p:txBody>
+          <a:bodyPr/>
+          <a:lstStyle/>
+          <a:p>
+            <a:pPr>
+              <a:defRPr sz="4000">
                 <a:solidFill>
-                  <a:srgbClr val="000000"/>
+                  <a:srgbClr val="3A70BC"/>
                 </a:solidFill>
               </a:defRPr>
             </a:pPr>
-            <a:r>
-              <a:t>บัญญัติรักยิ่งใหญ่</a:t>
-            </a:r>
-            <a:br/>
-            <a:r>
-              <a:t>ให้เรารักพระองค์</a:t>
-            </a:r>
-            <a:br/>
-            <a:r>
-              <a:t>ด้วยสุดใจ สุดจิต</a:t>
-            </a:r>
-            <a:br/>
-            <a:r>
-              <a:t>สุดกำลังความคิด</a:t>
-            </a:r>
-            <a:br/>
-            <a:r>
-              <a:t>บัญญัติรักพระเจ้า</a:t>
-            </a:r>
-            <a:br/>
-            <a:r>
-              <a:t>ให้เรารักเพื่อนบ้านเหมือนรักตนเอง</a:t>
-            </a:r>
           </a:p>
         </p:txBody>
       </p:sp>
@@ -3324,28 +3320,36 @@
           <a:p>
             <a:pPr algn="ctr">
               <a:lnSpc>
-                <a:spcPts val="7000"/>
+                <a:spcPts val="5700"/>
               </a:lnSpc>
-              <a:defRPr sz="5000">
+              <a:defRPr sz="4000">
                 <a:solidFill>
                   <a:srgbClr val="000000"/>
                 </a:solidFill>
               </a:defRPr>
             </a:pPr>
             <a:r>
-              <a:t>ถ้าเรารักกัน</a:t>
+              <a:t>ฉันเกิดมาเพื่อสรรเสริญ</a:t>
             </a:r>
             <a:br/>
             <a:r>
-              <a:t>นั่นแหละคนทั้งปวง</a:t>
+              <a:t>ฉันเกิดมาเพื่อยกพระนามพระองค์</a:t>
             </a:r>
             <a:br/>
             <a:r>
-              <a:t>จะรู้ว่าเรา</a:t>
+              <a:t>ตลอดชีวีของฉันจะโมทนาขอบพระคุณ</a:t>
             </a:r>
             <a:br/>
             <a:r>
-              <a:t>เป็นสาวกพระองค์</a:t>
+              <a:t>เพราะฉันเกิดมาเพื่อรักพระองค์</a:t>
+            </a:r>
+            <a:br/>
+            <a:r>
+              <a:t>(จะ)ขอนมัสการที่เบื้องพระบาท</a:t>
+            </a:r>
+            <a:br/>
+            <a:r>
+              <a:t>และจะทำตามพระทัย ฉันอยู่เพื่อพระองค์</a:t>
             </a:r>
           </a:p>
         </p:txBody>
@@ -3392,36 +3396,32 @@
           <a:p>
             <a:pPr algn="ctr">
               <a:lnSpc>
-                <a:spcPts val="7000"/>
+                <a:spcPts val="6100"/>
               </a:lnSpc>
-              <a:defRPr sz="5000">
+              <a:defRPr sz="4000">
                 <a:solidFill>
                   <a:srgbClr val="000000"/>
                 </a:solidFill>
               </a:defRPr>
             </a:pPr>
             <a:r>
-              <a:t>บัญญัติรักยิ่งใหญ่</a:t>
+              <a:t>ฉันจะสรรเสริญเสมอ ฉันจะยอพระเกียรติพระองค์เรื่อยไป</a:t>
             </a:r>
             <a:br/>
             <a:r>
-              <a:t>ให้เรารักพระองค์</a:t>
+              <a:t>ตลอดชีวิตของฉันจะโมทนาขอบพระคุณ</a:t>
             </a:r>
             <a:br/>
             <a:r>
-              <a:t>ด้วยสุดใจ สุดจิต</a:t>
+              <a:t>เพราะฉันจะรักพระองค์เสมอ</a:t>
             </a:r>
             <a:br/>
             <a:r>
-              <a:t>สุดกำลังความคิด</a:t>
+              <a:t>(จะ)ขอนมัสการที่เบื้องพระบาท</a:t>
             </a:r>
             <a:br/>
             <a:r>
-              <a:t>บัญญัติรักพระเจ้า</a:t>
-            </a:r>
-            <a:br/>
-            <a:r>
-              <a:t>ให้เรารักเพื่อนบ้านเหมือนรักตนเอง</a:t>
+              <a:t>และจะยำเกรงพระองค์ ฉันอยู่เพื่อพระองค์</a:t>
             </a:r>
           </a:p>
         </p:txBody>

</xml_diff>

<commit_message>
add slide background feature in progress
</commit_message>
<xml_diff>
--- a/finishedppt/WorshipSongs.pptx
+++ b/finishedppt/WorshipSongs.pptx
@@ -3124,7 +3124,7 @@
           <a:lstStyle/>
           <a:p>
             <a:r>
-              <a:t>เหนือโลกา</a:t>
+              <a:t>ตั้งแต่ดวงตะวันเบิกฟ้า</a:t>
             </a:r>
           </a:p>
         </p:txBody>
@@ -3145,14 +3145,14 @@
           <a:lstStyle/>
           <a:p>
             <a:pPr>
-              <a:defRPr sz="4000">
+              <a:defRPr sz="4600">
                 <a:solidFill>
                   <a:srgbClr val="3A70BC"/>
                 </a:solidFill>
               </a:defRPr>
             </a:pPr>
             <a:r>
-              <a:t>All The Earth</a:t>
+              <a:t>From the Rising of the Sun</a:t>
             </a:r>
           </a:p>
         </p:txBody>
@@ -3199,20 +3199,28 @@
           <a:p>
             <a:pPr algn="ctr">
               <a:lnSpc>
-                <a:spcPts val="5500"/>
+                <a:spcPts val="4800"/>
               </a:lnSpc>
-              <a:defRPr sz="4600">
+              <a:defRPr sz="4000">
                 <a:solidFill>
                   <a:srgbClr val="000000"/>
                 </a:solidFill>
               </a:defRPr>
             </a:pPr>
             <a:r>
-              <a:t>โปรดยึดข้า ให้ความรักพระองค์ล้อมข้า</a:t>
-            </a:r>
-            <a:br/>
-            <a:r>
-              <a:t>นำข้าใกล้ ชิดพระทัยพระองค์</a:t>
+              <a:t>** ชั่วนิรันดร์ พระองค์สัตย์ซื่อ</a:t>
+            </a:r>
+            <a:br/>
+            <a:r>
+              <a:t>ชั่วนิรันดร์ ทรงฤทธา ชั่วนิรันดร์</a:t>
+            </a:r>
+            <a:br/>
+            <a:r>
+              <a:t>ทรงอยู่กับเรา ชั่วนิรันดร์ และนิรันดร์</a:t>
+            </a:r>
+            <a:br/>
+            <a:r>
+              <a:t>นิจนิรันดร์</a:t>
             </a:r>
           </a:p>
         </p:txBody>
@@ -3241,22 +3249,29 @@
           <a:p>
             <a:pPr algn="ctr">
               <a:lnSpc>
-                <a:spcPts val="5500"/>
+                <a:spcPts val="4800"/>
               </a:lnSpc>
-              <a:defRPr sz="4400">
+              <a:defRPr sz="3500">
                 <a:solidFill>
                   <a:srgbClr val="3A70BC"/>
                 </a:solidFill>
               </a:defRPr>
             </a:pPr>
             <a:r>
-              <a:t>Hold me close. Let Your love surround me</a:t>
-            </a:r>
-            <a:br/>
-            <a:r>
-              <a:t> Bring me near. Draw me to Your side</a:t>
-            </a:r>
-            <a:br/>
+              <a:t>Forever God is faithful</a:t>
+            </a:r>
+            <a:br/>
+            <a:r>
+              <a:t> Forever God is strong</a:t>
+            </a:r>
+            <a:br/>
+            <a:r>
+              <a:t> Forever God is with us</a:t>
+            </a:r>
+            <a:br/>
+            <a:r>
+              <a:t> Forever</a:t>
+            </a:r>
           </a:p>
         </p:txBody>
       </p:sp>
@@ -3302,24 +3317,24 @@
           <a:p>
             <a:pPr algn="ctr">
               <a:lnSpc>
-                <a:spcPts val="5500"/>
+                <a:spcPts val="4800"/>
               </a:lnSpc>
-              <a:defRPr sz="4600">
+              <a:defRPr sz="4000">
                 <a:solidFill>
                   <a:srgbClr val="000000"/>
                 </a:solidFill>
               </a:defRPr>
             </a:pPr>
             <a:r>
-              <a:t>เมื่อข้ารอคอย จะผงาดขึ้นดังนกอินทรีย์</a:t>
-            </a:r>
-            <a:br/>
-            <a:r>
-              <a:t>แล้วข้าจะบินต่อไป พระวิญญาณพระองค์ทรงนำ</a:t>
-            </a:r>
-            <a:br/>
-            <a:r>
-              <a:t>โดยอำนาจความรักพระองค์</a:t>
+              <a:t>3. จากดวงตะวัน</a:t>
+            </a:r>
+            <a:br/>
+            <a:r>
+              <a:t>ขึ้นจนลับลาไป</a:t>
+            </a:r>
+            <a:br/>
+            <a:r>
+              <a:t>ความรักพระองค์ดำรงนิรันดร์</a:t>
             </a:r>
           </a:p>
         </p:txBody>
@@ -3341,24 +3356,29 @@
           <a:noFill/>
         </p:spPr>
         <p:txBody>
-          <a:bodyPr wrap="square">
+          <a:bodyPr wrap="none">
             <a:spAutoFit/>
           </a:bodyPr>
           <a:lstStyle/>
           <a:p>
             <a:pPr algn="ctr">
               <a:lnSpc>
-                <a:spcPts val="5500"/>
+                <a:spcPts val="4800"/>
               </a:lnSpc>
-              <a:defRPr sz="4400">
+              <a:defRPr sz="3500">
                 <a:solidFill>
                   <a:srgbClr val="3A70BC"/>
                 </a:solidFill>
               </a:defRPr>
             </a:pPr>
             <a:r>
-              <a:t>And as I wait. I'll rise up like the eagle. And I will soar with You. Your Spirit leads me on. In the power of Your love.</a:t>
-            </a:r>
+              <a:t>From the rising to the setting sun</a:t>
+            </a:r>
+            <a:br/>
+            <a:r>
+              <a:t> His love endures forever</a:t>
+            </a:r>
+            <a:br/>
           </a:p>
         </p:txBody>
       </p:sp>
@@ -3404,24 +3424,24 @@
           <a:p>
             <a:pPr algn="ctr">
               <a:lnSpc>
-                <a:spcPts val="5500"/>
+                <a:spcPts val="4800"/>
               </a:lnSpc>
-              <a:defRPr sz="4600">
+              <a:defRPr sz="4000">
                 <a:solidFill>
                   <a:srgbClr val="000000"/>
                 </a:solidFill>
               </a:defRPr>
             </a:pPr>
             <a:r>
-              <a:t>โปรดเปิดตาของข้า ให้มองเห็นพระพักตร์พระองค์</a:t>
-            </a:r>
-            <a:br/>
-            <a:r>
-              <a:t>ให้เข้าใจความรักแท้</a:t>
-            </a:r>
-            <a:br/>
-            <a:r>
-              <a:t>ที่ดำรงภายใน</a:t>
+              <a:t>โดยพระคุณพระองค์ ทรงนำเราก้าวไป</a:t>
+            </a:r>
+            <a:br/>
+            <a:r>
+              <a:t>ความรักพระองค์ดำรงนิรันดร์</a:t>
+            </a:r>
+            <a:br/>
+            <a:r>
+              <a:t>เราร้อง สรรเสริญ</a:t>
             </a:r>
           </a:p>
         </p:txBody>
@@ -3443,24 +3463,33 @@
           <a:noFill/>
         </p:spPr>
         <p:txBody>
-          <a:bodyPr wrap="square">
+          <a:bodyPr wrap="none">
             <a:spAutoFit/>
           </a:bodyPr>
           <a:lstStyle/>
           <a:p>
             <a:pPr algn="ctr">
               <a:lnSpc>
-                <a:spcPts val="5500"/>
+                <a:spcPts val="4800"/>
               </a:lnSpc>
-              <a:defRPr sz="4400">
+              <a:defRPr sz="3500">
                 <a:solidFill>
                   <a:srgbClr val="3A70BC"/>
                 </a:solidFill>
               </a:defRPr>
             </a:pPr>
             <a:r>
-              <a:t>Lord unveil my eyes. Let me see You face to face. The knowledge of Your love. As You live in me.</a:t>
-            </a:r>
+              <a:t>By the grace of God we will carry on</a:t>
+            </a:r>
+            <a:br/>
+            <a:r>
+              <a:t> His love endures forever</a:t>
+            </a:r>
+            <a:br/>
+            <a:r>
+              <a:t> Sing praise, sing praise</a:t>
+            </a:r>
+            <a:br/>
           </a:p>
         </p:txBody>
       </p:sp>
@@ -3499,23 +3528,35 @@
           <a:noFill/>
         </p:spPr>
         <p:txBody>
-          <a:bodyPr wrap="square">
+          <a:bodyPr wrap="none">
             <a:spAutoFit/>
           </a:bodyPr>
           <a:lstStyle/>
           <a:p>
             <a:pPr algn="ctr">
               <a:lnSpc>
-                <a:spcPts val="5500"/>
+                <a:spcPts val="4800"/>
               </a:lnSpc>
-              <a:defRPr sz="4600">
+              <a:defRPr sz="4000">
                 <a:solidFill>
                   <a:srgbClr val="000000"/>
                 </a:solidFill>
               </a:defRPr>
             </a:pPr>
             <a:r>
-              <a:t>โปรดเปลี่ยนแปลงความคิด เมื่อทรงเปิดเผยพระทัยในชีวิต ให้ดำเนินทุก ทุกวัน โดยอำนาจความรักพระองค์</a:t>
+              <a:t>** ชั่วนิรันดร์ พระองค์สัตย์ซื่อ</a:t>
+            </a:r>
+            <a:br/>
+            <a:r>
+              <a:t>ชั่วนิรันดร์ ทรงฤทธา ชั่วนิรันดร์</a:t>
+            </a:r>
+            <a:br/>
+            <a:r>
+              <a:t>ทรงอยู่กับเรา ชั่วนิรันดร์ และนิรันดร์</a:t>
+            </a:r>
+            <a:br/>
+            <a:r>
+              <a:t>นิจนิรันดร์</a:t>
             </a:r>
           </a:p>
         </p:txBody>
@@ -3537,23 +3578,35 @@
           <a:noFill/>
         </p:spPr>
         <p:txBody>
-          <a:bodyPr wrap="square">
+          <a:bodyPr wrap="none">
             <a:spAutoFit/>
           </a:bodyPr>
           <a:lstStyle/>
           <a:p>
             <a:pPr algn="ctr">
               <a:lnSpc>
-                <a:spcPts val="5500"/>
+                <a:spcPts val="4800"/>
               </a:lnSpc>
-              <a:defRPr sz="4400">
+              <a:defRPr sz="3500">
                 <a:solidFill>
                   <a:srgbClr val="3A70BC"/>
                 </a:solidFill>
               </a:defRPr>
             </a:pPr>
             <a:r>
-              <a:t>Lord renew my mind. As Your will unfolds in my life. In living every day. In the power of Your love.</a:t>
+              <a:t>Forever God is faithful</a:t>
+            </a:r>
+            <a:br/>
+            <a:r>
+              <a:t> Forever God is strong</a:t>
+            </a:r>
+            <a:br/>
+            <a:r>
+              <a:t> Forever God is with us</a:t>
+            </a:r>
+            <a:br/>
+            <a:r>
+              <a:t> Forever</a:t>
             </a:r>
           </a:p>
         </p:txBody>
@@ -3578,86 +3631,47 @@
       <p:grpSpPr/>
       <p:sp>
         <p:nvSpPr>
-          <p:cNvPr id="2" name="TextBox 1"/>
-          <p:cNvSpPr txBox="1"/>
-          <p:nvPr/>
-        </p:nvSpPr>
-        <p:spPr>
-          <a:xfrm>
-            <a:off x="685800" y="228600"/>
-            <a:ext cx="7772400" cy="2971800"/>
-          </a:xfrm>
-          <a:prstGeom prst="rect">
-            <a:avLst/>
-          </a:prstGeom>
-          <a:noFill/>
-        </p:spPr>
-        <p:txBody>
-          <a:bodyPr wrap="none">
-            <a:spAutoFit/>
-          </a:bodyPr>
-          <a:lstStyle/>
-          <a:p>
-            <a:pPr algn="ctr">
-              <a:lnSpc>
-                <a:spcPts val="5500"/>
-              </a:lnSpc>
+          <p:cNvPr id="2" name="Title 1"/>
+          <p:cNvSpPr>
+            <a:spLocks noGrp="1"/>
+          </p:cNvSpPr>
+          <p:nvPr>
+            <p:ph type="ctrTitle"/>
+          </p:nvPr>
+        </p:nvSpPr>
+        <p:spPr/>
+        <p:txBody>
+          <a:bodyPr/>
+          <a:lstStyle/>
+          <a:p>
+            <a:r>
+              <a:t>เรานมัสการ (เราพึ่งพาพระองค์)</a:t>
+            </a:r>
+          </a:p>
+        </p:txBody>
+      </p:sp>
+      <p:sp>
+        <p:nvSpPr>
+          <p:cNvPr id="3" name="Subtitle 2"/>
+          <p:cNvSpPr>
+            <a:spLocks noGrp="1"/>
+          </p:cNvSpPr>
+          <p:nvPr>
+            <p:ph type="subTitle" idx="1"/>
+          </p:nvPr>
+        </p:nvSpPr>
+        <p:spPr/>
+        <p:txBody>
+          <a:bodyPr/>
+          <a:lstStyle/>
+          <a:p>
+            <a:pPr>
               <a:defRPr sz="4600">
-                <a:solidFill>
-                  <a:srgbClr val="000000"/>
-                </a:solidFill>
-              </a:defRPr>
-            </a:pPr>
-            <a:r>
-              <a:t>โปรดยึดข้า ให้ความรักพระองค์ล้อมข้า</a:t>
-            </a:r>
-            <a:br/>
-            <a:r>
-              <a:t>นำข้าใกล้ ชิดพระทัยพระองค์</a:t>
-            </a:r>
-          </a:p>
-        </p:txBody>
-      </p:sp>
-      <p:sp>
-        <p:nvSpPr>
-          <p:cNvPr id="3" name="TextBox 2"/>
-          <p:cNvSpPr txBox="1"/>
-          <p:nvPr/>
-        </p:nvSpPr>
-        <p:spPr>
-          <a:xfrm>
-            <a:off x="685800" y="3657600"/>
-            <a:ext cx="7772400" cy="2971800"/>
-          </a:xfrm>
-          <a:prstGeom prst="rect">
-            <a:avLst/>
-          </a:prstGeom>
-          <a:noFill/>
-        </p:spPr>
-        <p:txBody>
-          <a:bodyPr wrap="none">
-            <a:spAutoFit/>
-          </a:bodyPr>
-          <a:lstStyle/>
-          <a:p>
-            <a:pPr algn="ctr">
-              <a:lnSpc>
-                <a:spcPts val="5500"/>
-              </a:lnSpc>
-              <a:defRPr sz="4400">
                 <a:solidFill>
                   <a:srgbClr val="3A70BC"/>
                 </a:solidFill>
               </a:defRPr>
             </a:pPr>
-            <a:r>
-              <a:t>Hold me close. Let Your love surround me</a:t>
-            </a:r>
-            <a:br/>
-            <a:r>
-              <a:t> Bring me near. Draw me to Your side</a:t>
-            </a:r>
-            <a:br/>
           </a:p>
         </p:txBody>
       </p:sp>
@@ -3687,8 +3701,8 @@
         </p:nvSpPr>
         <p:spPr>
           <a:xfrm>
-            <a:off x="685800" y="228600"/>
-            <a:ext cx="7772400" cy="2971800"/>
+            <a:off x="914400" y="457200"/>
+            <a:ext cx="7315200" cy="5486400"/>
           </a:xfrm>
           <a:prstGeom prst="rect">
             <a:avLst/>
@@ -3703,62 +3717,28 @@
           <a:p>
             <a:pPr algn="ctr">
               <a:lnSpc>
-                <a:spcPts val="5500"/>
+                <a:spcPts val="7000"/>
               </a:lnSpc>
-              <a:defRPr sz="4600">
+              <a:defRPr sz="4000">
                 <a:solidFill>
                   <a:srgbClr val="000000"/>
                 </a:solidFill>
               </a:defRPr>
             </a:pPr>
             <a:r>
-              <a:t>เมื่อข้ารอคอย จะผงาดขึ้นดังนกอินทรีย์</a:t>
-            </a:r>
-            <a:br/>
-            <a:r>
-              <a:t>แล้วข้าจะบินต่อไป พระวิญญาณพระองค์ทรงนำ</a:t>
-            </a:r>
-            <a:br/>
-            <a:r>
-              <a:t>โดยอำนาจความรักพระองค์</a:t>
-            </a:r>
-          </a:p>
-        </p:txBody>
-      </p:sp>
-      <p:sp>
-        <p:nvSpPr>
-          <p:cNvPr id="3" name="TextBox 2"/>
-          <p:cNvSpPr txBox="1"/>
-          <p:nvPr/>
-        </p:nvSpPr>
-        <p:spPr>
-          <a:xfrm>
-            <a:off x="685800" y="3657600"/>
-            <a:ext cx="7772400" cy="2971800"/>
-          </a:xfrm>
-          <a:prstGeom prst="rect">
-            <a:avLst/>
-          </a:prstGeom>
-          <a:noFill/>
-        </p:spPr>
-        <p:txBody>
-          <a:bodyPr wrap="square">
-            <a:spAutoFit/>
-          </a:bodyPr>
-          <a:lstStyle/>
-          <a:p>
-            <a:pPr algn="ctr">
-              <a:lnSpc>
-                <a:spcPts val="5500"/>
-              </a:lnSpc>
-              <a:defRPr sz="4400">
-                <a:solidFill>
-                  <a:srgbClr val="3A70BC"/>
-                </a:solidFill>
-              </a:defRPr>
-            </a:pPr>
-            <a:r>
-              <a:t>And as I wait. I'll rise up like the eagle. And I will soar with You. Your Spirit leads me on. In the power of Your love.</a:t>
+              <a:t>เราพึ่งพาพระองค์</a:t>
+            </a:r>
+            <a:br/>
+            <a:r>
+              <a:t>พระองค์ทรงเป็นทุกสิ่งที่ใจเราต้องการ</a:t>
+            </a:r>
+            <a:br/>
+            <a:r>
+              <a:t>เราเชื่อในพระองค์</a:t>
+            </a:r>
+            <a:br/>
+            <a:r>
+              <a:t>พระองค์บรรดาลทุกสิ่งที่เกินความเข้าใจของเรา</a:t>
             </a:r>
           </a:p>
         </p:txBody>
@@ -3783,49 +3763,50 @@
       <p:grpSpPr/>
       <p:sp>
         <p:nvSpPr>
-          <p:cNvPr id="2" name="Title 1"/>
-          <p:cNvSpPr>
-            <a:spLocks noGrp="1"/>
-          </p:cNvSpPr>
-          <p:nvPr>
-            <p:ph type="ctrTitle"/>
-          </p:nvPr>
-        </p:nvSpPr>
-        <p:spPr/>
-        <p:txBody>
-          <a:bodyPr/>
-          <a:lstStyle/>
-          <a:p>
-            <a:r>
-              <a:t>พระองค์ทรงอยู่ในชีวิตฉัน</a:t>
-            </a:r>
-          </a:p>
-        </p:txBody>
-      </p:sp>
-      <p:sp>
-        <p:nvSpPr>
-          <p:cNvPr id="3" name="Subtitle 2"/>
-          <p:cNvSpPr>
-            <a:spLocks noGrp="1"/>
-          </p:cNvSpPr>
-          <p:nvPr>
-            <p:ph type="subTitle" idx="1"/>
-          </p:nvPr>
-        </p:nvSpPr>
-        <p:spPr/>
-        <p:txBody>
-          <a:bodyPr/>
-          <a:lstStyle/>
-          <a:p>
-            <a:pPr>
+          <p:cNvPr id="2" name="TextBox 1"/>
+          <p:cNvSpPr txBox="1"/>
+          <p:nvPr/>
+        </p:nvSpPr>
+        <p:spPr>
+          <a:xfrm>
+            <a:off x="914400" y="457200"/>
+            <a:ext cx="7315200" cy="5486400"/>
+          </a:xfrm>
+          <a:prstGeom prst="rect">
+            <a:avLst/>
+          </a:prstGeom>
+          <a:noFill/>
+        </p:spPr>
+        <p:txBody>
+          <a:bodyPr wrap="none">
+            <a:spAutoFit/>
+          </a:bodyPr>
+          <a:lstStyle/>
+          <a:p>
+            <a:pPr algn="ctr">
+              <a:lnSpc>
+                <a:spcPts val="7000"/>
+              </a:lnSpc>
               <a:defRPr sz="4000">
                 <a:solidFill>
-                  <a:srgbClr val="3A70BC"/>
+                  <a:srgbClr val="000000"/>
                 </a:solidFill>
               </a:defRPr>
             </a:pPr>
             <a:r>
-              <a:t>Through it all</a:t>
+              <a:t>เรานมัสการ องค์พระเจ้ายิ่งใหญ่</a:t>
+            </a:r>
+            <a:br/>
+            <a:r>
+              <a:t>ไม่มีอะไรที่อยากเกินกว่าพระองค์จะทำ</a:t>
+            </a:r>
+            <a:br/>
+            <a:r>
+              <a:t>เรานมัสการ องค์พระเจ้ายิ่งใหญ่</a:t>
+            </a:r>
+            <a:br/>
+            <a:r>
+              <a:t>และไม่มีใครเทียบได้กับพระองค์</a:t>
             </a:r>
           </a:p>
         </p:txBody>
@@ -3850,94 +3831,47 @@
       <p:grpSpPr/>
       <p:sp>
         <p:nvSpPr>
-          <p:cNvPr id="2" name="TextBox 1"/>
-          <p:cNvSpPr txBox="1"/>
-          <p:nvPr/>
-        </p:nvSpPr>
-        <p:spPr>
-          <a:xfrm>
-            <a:off x="685800" y="228600"/>
-            <a:ext cx="7772400" cy="2971800"/>
-          </a:xfrm>
-          <a:prstGeom prst="rect">
-            <a:avLst/>
-          </a:prstGeom>
-          <a:noFill/>
-        </p:spPr>
-        <p:txBody>
-          <a:bodyPr wrap="none">
-            <a:spAutoFit/>
-          </a:bodyPr>
-          <a:lstStyle/>
-          <a:p>
-            <a:pPr algn="ctr">
-              <a:lnSpc>
-                <a:spcPts val="5500"/>
-              </a:lnSpc>
+          <p:cNvPr id="2" name="Title 1"/>
+          <p:cNvSpPr>
+            <a:spLocks noGrp="1"/>
+          </p:cNvSpPr>
+          <p:nvPr>
+            <p:ph type="ctrTitle"/>
+          </p:nvPr>
+        </p:nvSpPr>
+        <p:spPr/>
+        <p:txBody>
+          <a:bodyPr/>
+          <a:lstStyle/>
+          <a:p>
+            <a:r>
+              <a:t>ไม่ว่าอยู่แห่งหนไหน</a:t>
+            </a:r>
+          </a:p>
+        </p:txBody>
+      </p:sp>
+      <p:sp>
+        <p:nvSpPr>
+          <p:cNvPr id="3" name="Subtitle 2"/>
+          <p:cNvSpPr>
+            <a:spLocks noGrp="1"/>
+          </p:cNvSpPr>
+          <p:nvPr>
+            <p:ph type="subTitle" idx="1"/>
+          </p:nvPr>
+        </p:nvSpPr>
+        <p:spPr/>
+        <p:txBody>
+          <a:bodyPr/>
+          <a:lstStyle/>
+          <a:p>
+            <a:pPr>
               <a:defRPr sz="4600">
-                <a:solidFill>
-                  <a:srgbClr val="000000"/>
-                </a:solidFill>
-              </a:defRPr>
-            </a:pPr>
-            <a:r>
-              <a:t>พระองค์ทรงอยู่ในชีวิตฉัน</a:t>
-            </a:r>
-            <a:br/>
-            <a:r>
-              <a:t>ทรงเฝ้ามองอยู่ทุกเวลา</a:t>
-            </a:r>
-            <a:br/>
-            <a:r>
-              <a:t>พระหัตถ์พระองค์ล้อมชีวา</a:t>
-            </a:r>
-          </a:p>
-        </p:txBody>
-      </p:sp>
-      <p:sp>
-        <p:nvSpPr>
-          <p:cNvPr id="3" name="TextBox 2"/>
-          <p:cNvSpPr txBox="1"/>
-          <p:nvPr/>
-        </p:nvSpPr>
-        <p:spPr>
-          <a:xfrm>
-            <a:off x="685800" y="3657600"/>
-            <a:ext cx="7772400" cy="2971800"/>
-          </a:xfrm>
-          <a:prstGeom prst="rect">
-            <a:avLst/>
-          </a:prstGeom>
-          <a:noFill/>
-        </p:spPr>
-        <p:txBody>
-          <a:bodyPr wrap="none">
-            <a:spAutoFit/>
-          </a:bodyPr>
-          <a:lstStyle/>
-          <a:p>
-            <a:pPr algn="ctr">
-              <a:lnSpc>
-                <a:spcPts val="5500"/>
-              </a:lnSpc>
-              <a:defRPr sz="4400">
                 <a:solidFill>
                   <a:srgbClr val="3A70BC"/>
                 </a:solidFill>
               </a:defRPr>
             </a:pPr>
-            <a:r>
-              <a:t>You are forever in my life</a:t>
-            </a:r>
-            <a:br/>
-            <a:r>
-              <a:t> You see me through the seasons</a:t>
-            </a:r>
-            <a:br/>
-            <a:r>
-              <a:t> Cover me with Your hand</a:t>
-            </a:r>
-            <a:br/>
           </a:p>
         </p:txBody>
       </p:sp>
@@ -3967,8 +3901,8 @@
         </p:nvSpPr>
         <p:spPr>
           <a:xfrm>
-            <a:off x="685800" y="228600"/>
-            <a:ext cx="7772400" cy="2971800"/>
+            <a:off x="914400" y="457200"/>
+            <a:ext cx="7315200" cy="5486400"/>
           </a:xfrm>
           <a:prstGeom prst="rect">
             <a:avLst/>
@@ -3983,72 +3917,33 @@
           <a:p>
             <a:pPr algn="ctr">
               <a:lnSpc>
-                <a:spcPts val="5500"/>
+                <a:spcPts val="7000"/>
               </a:lnSpc>
-              <a:defRPr sz="4600">
+              <a:defRPr sz="4000">
                 <a:solidFill>
                   <a:srgbClr val="000000"/>
                 </a:solidFill>
               </a:defRPr>
             </a:pPr>
             <a:r>
-              <a:t>นำฉันให้อยู่ในความชอบธรรม</a:t>
-            </a:r>
-            <a:br/>
-            <a:r>
-              <a:t>และฉันจึงจับตา</a:t>
-            </a:r>
-            <a:br/>
-            <a:r>
-              <a:t>รอคอยพระศิลา</a:t>
-            </a:r>
-          </a:p>
-        </p:txBody>
-      </p:sp>
-      <p:sp>
-        <p:nvSpPr>
-          <p:cNvPr id="3" name="TextBox 2"/>
-          <p:cNvSpPr txBox="1"/>
-          <p:nvPr/>
-        </p:nvSpPr>
-        <p:spPr>
-          <a:xfrm>
-            <a:off x="685800" y="3657600"/>
-            <a:ext cx="7772400" cy="2971800"/>
-          </a:xfrm>
-          <a:prstGeom prst="rect">
-            <a:avLst/>
-          </a:prstGeom>
-          <a:noFill/>
-        </p:spPr>
-        <p:txBody>
-          <a:bodyPr wrap="none">
-            <a:spAutoFit/>
-          </a:bodyPr>
-          <a:lstStyle/>
-          <a:p>
-            <a:pPr algn="ctr">
-              <a:lnSpc>
-                <a:spcPts val="5500"/>
-              </a:lnSpc>
-              <a:defRPr sz="4400">
-                <a:solidFill>
-                  <a:srgbClr val="3A70BC"/>
-                </a:solidFill>
-              </a:defRPr>
-            </a:pPr>
-            <a:r>
-              <a:t>And lead me in Your righteousness</a:t>
-            </a:r>
-            <a:br/>
-            <a:r>
-              <a:t> And I look to You</a:t>
-            </a:r>
-            <a:br/>
-            <a:r>
-              <a:t> And I wait on You</a:t>
-            </a:r>
-            <a:br/>
+              <a:t>เมื่อตาใจข้าได้เห็น</a:t>
+            </a:r>
+            <a:br/>
+            <a:r>
+              <a:t>พระวิญญาณของพระเจ้า</a:t>
+            </a:r>
+            <a:br/>
+            <a:r>
+              <a:t>ข้าได้พบสันติสุข</a:t>
+            </a:r>
+            <a:br/>
+            <a:r>
+              <a:t>ที่โอบล้อมรอบตัวข้าไว้</a:t>
+            </a:r>
+            <a:br/>
+            <a:r>
+              <a:t>ข้าสุขใจเหลือจะบรรยาย</a:t>
+            </a:r>
           </a:p>
         </p:txBody>
       </p:sp>
@@ -4078,8 +3973,8 @@
         </p:nvSpPr>
         <p:spPr>
           <a:xfrm>
-            <a:off x="685800" y="228600"/>
-            <a:ext cx="7772400" cy="2971800"/>
+            <a:off x="914400" y="457200"/>
+            <a:ext cx="7315200" cy="5486400"/>
           </a:xfrm>
           <a:prstGeom prst="rect">
             <a:avLst/>
@@ -4094,72 +3989,33 @@
           <a:p>
             <a:pPr algn="ctr">
               <a:lnSpc>
-                <a:spcPts val="5500"/>
+                <a:spcPts val="7000"/>
               </a:lnSpc>
-              <a:defRPr sz="4600">
+              <a:defRPr sz="4000">
                 <a:solidFill>
                   <a:srgbClr val="000000"/>
                 </a:solidFill>
               </a:defRPr>
             </a:pPr>
             <a:r>
-              <a:t>จะร้องเพลงสรรเสริญ</a:t>
-            </a:r>
-            <a:br/>
-            <a:r>
-              <a:t>เพราะรักพระองค์</a:t>
-            </a:r>
-            <a:br/>
-            <a:r>
-              <a:t>เพราะความรักพระองค์มั่นคง</a:t>
-            </a:r>
-          </a:p>
-        </p:txBody>
-      </p:sp>
-      <p:sp>
-        <p:nvSpPr>
-          <p:cNvPr id="3" name="TextBox 2"/>
-          <p:cNvSpPr txBox="1"/>
-          <p:nvPr/>
-        </p:nvSpPr>
-        <p:spPr>
-          <a:xfrm>
-            <a:off x="685800" y="3657600"/>
-            <a:ext cx="7772400" cy="2971800"/>
-          </a:xfrm>
-          <a:prstGeom prst="rect">
-            <a:avLst/>
-          </a:prstGeom>
-          <a:noFill/>
-        </p:spPr>
-        <p:txBody>
-          <a:bodyPr wrap="none">
-            <a:spAutoFit/>
-          </a:bodyPr>
-          <a:lstStyle/>
-          <a:p>
-            <a:pPr algn="ctr">
-              <a:lnSpc>
-                <a:spcPts val="5500"/>
-              </a:lnSpc>
-              <a:defRPr sz="4400">
-                <a:solidFill>
-                  <a:srgbClr val="3A70BC"/>
-                </a:solidFill>
-              </a:defRPr>
-            </a:pPr>
-            <a:r>
-              <a:t>I will sing to You</a:t>
-            </a:r>
-            <a:br/>
-            <a:r>
-              <a:t> Lord. A hymn of love</a:t>
-            </a:r>
-            <a:br/>
-            <a:r>
-              <a:t> For Your faithfulness to me</a:t>
-            </a:r>
-            <a:br/>
+              <a:t>ไม่ว่าอยู่แห่งหนไหน</a:t>
+            </a:r>
+            <a:br/>
+            <a:r>
+              <a:t>ข้าจะนมัสการ และไม่ว่าเป็นเช่นใด</a:t>
+            </a:r>
+            <a:br/>
+            <a:r>
+              <a:t>ข้าจะนมัสการ ไม่ว่าอยู่แห่งหนไหน</a:t>
+            </a:r>
+            <a:br/>
+            <a:r>
+              <a:t>ข้าจะนมัสการ และไม่ว่าเป็นเช่นใด</a:t>
+            </a:r>
+            <a:br/>
+            <a:r>
+              <a:t>ก็จะนมัสการ</a:t>
+            </a:r>
           </a:p>
         </p:txBody>
       </p:sp>
@@ -4205,24 +4061,24 @@
           <a:p>
             <a:pPr algn="ctr">
               <a:lnSpc>
-                <a:spcPts val="5500"/>
+                <a:spcPts val="4800"/>
               </a:lnSpc>
-              <a:defRPr sz="4600">
+              <a:defRPr sz="4000">
                 <a:solidFill>
                   <a:srgbClr val="000000"/>
                 </a:solidFill>
               </a:defRPr>
             </a:pPr>
             <a:r>
-              <a:t>แผ่นดินร่วมร้องเปรมปรีด์ ในที่สูงอันชื่นบาน</a:t>
-            </a:r>
-            <a:br/>
-            <a:r>
-              <a:t>จักรวาลชื่นชมยินดี พระสิริของพระองค์</a:t>
-            </a:r>
-            <a:br/>
-            <a:r>
-              <a:t>ครอบครองอยู่เหนือโลกา</a:t>
+              <a:t>ตั้งแต่ดวงตะวันเบิกฟ้า</a:t>
+            </a:r>
+            <a:br/>
+            <a:r>
+              <a:t>แสงนภาเลื่อนกลับ อัสดง</a:t>
+            </a:r>
+            <a:br/>
+            <a:r>
+              <a:t>นามพระองค์จะเป็นที่สรรเสริญ</a:t>
             </a:r>
           </a:p>
         </p:txBody>
@@ -4244,24 +4100,33 @@
           <a:noFill/>
         </p:spPr>
         <p:txBody>
-          <a:bodyPr wrap="square">
+          <a:bodyPr wrap="none">
             <a:spAutoFit/>
           </a:bodyPr>
           <a:lstStyle/>
           <a:p>
             <a:pPr algn="ctr">
               <a:lnSpc>
-                <a:spcPts val="5500"/>
+                <a:spcPts val="4800"/>
               </a:lnSpc>
-              <a:defRPr sz="4400">
+              <a:defRPr sz="3500">
                 <a:solidFill>
                   <a:srgbClr val="3A70BC"/>
                 </a:solidFill>
               </a:defRPr>
             </a:pPr>
             <a:r>
-              <a:t>The earth sings joyfully. All high place rejoicing. Universe is overjoyed. The Glory of the Lord is ruling all the earth.</a:t>
-            </a:r>
+              <a:t>From the rising of the sun</a:t>
+            </a:r>
+            <a:br/>
+            <a:r>
+              <a:t> To the going down of the same</a:t>
+            </a:r>
+            <a:br/>
+            <a:r>
+              <a:t> The Lord's name is to be praised</a:t>
+            </a:r>
+            <a:br/>
           </a:p>
         </p:txBody>
       </p:sp>
@@ -4291,8 +4156,8 @@
         </p:nvSpPr>
         <p:spPr>
           <a:xfrm>
-            <a:off x="685800" y="228600"/>
-            <a:ext cx="7772400" cy="2971800"/>
+            <a:off x="914400" y="457200"/>
+            <a:ext cx="7315200" cy="5486400"/>
           </a:xfrm>
           <a:prstGeom prst="rect">
             <a:avLst/>
@@ -4307,70 +4172,32 @@
           <a:p>
             <a:pPr algn="ctr">
               <a:lnSpc>
-                <a:spcPts val="5500"/>
+                <a:spcPts val="7000"/>
               </a:lnSpc>
-              <a:defRPr sz="4600">
+              <a:defRPr sz="4000">
                 <a:solidFill>
                   <a:srgbClr val="000000"/>
                 </a:solidFill>
               </a:defRPr>
             </a:pPr>
             <a:r>
-              <a:t>ประคองฉันให้อยู่ในอ้อมแขนนิรันดร์</a:t>
-            </a:r>
-            <a:br/>
-            <a:r>
-              <a:t>ไม่เคยทอดทิ้งฉันไป</a:t>
-            </a:r>
-            <a:br/>
-            <a:r>
-              <a:t>ไม่ว่าอย่างไร</a:t>
-            </a:r>
-          </a:p>
-        </p:txBody>
-      </p:sp>
-      <p:sp>
-        <p:nvSpPr>
-          <p:cNvPr id="3" name="TextBox 2"/>
-          <p:cNvSpPr txBox="1"/>
-          <p:nvPr/>
-        </p:nvSpPr>
-        <p:spPr>
-          <a:xfrm>
-            <a:off x="685800" y="3657600"/>
-            <a:ext cx="7772400" cy="2971800"/>
-          </a:xfrm>
-          <a:prstGeom prst="rect">
-            <a:avLst/>
-          </a:prstGeom>
-          <a:noFill/>
-        </p:spPr>
-        <p:txBody>
-          <a:bodyPr wrap="none">
-            <a:spAutoFit/>
-          </a:bodyPr>
-          <a:lstStyle/>
-          <a:p>
-            <a:pPr algn="ctr">
-              <a:lnSpc>
-                <a:spcPts val="5500"/>
-              </a:lnSpc>
-              <a:defRPr sz="4400">
-                <a:solidFill>
-                  <a:srgbClr val="3A70BC"/>
-                </a:solidFill>
-              </a:defRPr>
-            </a:pPr>
-            <a:r>
-              <a:t>I'm carried in everlasting arms</a:t>
-            </a:r>
-            <a:br/>
-            <a:r>
-              <a:t> You'll never let me go</a:t>
-            </a:r>
-            <a:br/>
-            <a:r>
-              <a:t> Through it all.</a:t>
+              <a:t>ข้าได้เห็นแสงสว่าง</a:t>
+            </a:r>
+            <a:br/>
+            <a:r>
+              <a:t>แห่งความจริงและความรัก</a:t>
+            </a:r>
+            <a:br/>
+            <a:r>
+              <a:t>ข้าได้พบสันติสุข</a:t>
+            </a:r>
+            <a:br/>
+            <a:r>
+              <a:t>ที่โอบล้อมรอบตัวข้าไว้</a:t>
+            </a:r>
+            <a:br/>
+            <a:r>
+              <a:t>อยู่ในความรักของพระองค์</a:t>
             </a:r>
           </a:p>
         </p:txBody>
@@ -4401,8 +4228,8 @@
         </p:nvSpPr>
         <p:spPr>
           <a:xfrm>
-            <a:off x="685800" y="228600"/>
-            <a:ext cx="7772400" cy="2971800"/>
+            <a:off x="914400" y="457200"/>
+            <a:ext cx="7315200" cy="5486400"/>
           </a:xfrm>
           <a:prstGeom prst="rect">
             <a:avLst/>
@@ -4417,70 +4244,36 @@
           <a:p>
             <a:pPr algn="ctr">
               <a:lnSpc>
-                <a:spcPts val="5500"/>
+                <a:spcPts val="7000"/>
               </a:lnSpc>
-              <a:defRPr sz="4600">
+              <a:defRPr sz="4000">
                 <a:solidFill>
                   <a:srgbClr val="000000"/>
                 </a:solidFill>
               </a:defRPr>
             </a:pPr>
             <a:r>
-              <a:t>ฮาเลลูยา</a:t>
-            </a:r>
-            <a:br/>
-            <a:r>
-              <a:t>ฮาเลลูยา</a:t>
-            </a:r>
-            <a:br/>
-            <a:r>
-              <a:t>ฮาเลลูยา</a:t>
-            </a:r>
-            <a:br/>
-            <a:r>
-              <a:t>ฮาเลลูยา</a:t>
-            </a:r>
-          </a:p>
-        </p:txBody>
-      </p:sp>
-      <p:sp>
-        <p:nvSpPr>
-          <p:cNvPr id="3" name="TextBox 2"/>
-          <p:cNvSpPr txBox="1"/>
-          <p:nvPr/>
-        </p:nvSpPr>
-        <p:spPr>
-          <a:xfrm>
-            <a:off x="685800" y="3657600"/>
-            <a:ext cx="7772400" cy="2971800"/>
-          </a:xfrm>
-          <a:prstGeom prst="rect">
-            <a:avLst/>
-          </a:prstGeom>
-          <a:noFill/>
-        </p:spPr>
-        <p:txBody>
-          <a:bodyPr wrap="none">
-            <a:spAutoFit/>
-          </a:bodyPr>
-          <a:lstStyle/>
-          <a:p>
-            <a:pPr algn="ctr">
-              <a:lnSpc>
-                <a:spcPts val="5500"/>
-              </a:lnSpc>
-              <a:defRPr sz="4400">
-                <a:solidFill>
-                  <a:srgbClr val="3A70BC"/>
-                </a:solidFill>
-              </a:defRPr>
-            </a:pPr>
-            <a:r>
-              <a:t>Hallelujah</a:t>
-            </a:r>
-            <a:br/>
-            <a:r>
-              <a:t> hallelujah</a:t>
+              <a:t>และในทุกเส้นทาง ที่ก้าวและเดินไป</a:t>
+            </a:r>
+            <a:br/>
+            <a:r>
+              <a:t>ให้ทุกวันเวลาในชีวิต</a:t>
+            </a:r>
+            <a:br/>
+            <a:r>
+              <a:t>นมัสการพระองค์เรื่อยไป</a:t>
+            </a:r>
+            <a:br/>
+            <a:r>
+              <a:t>และในทุกเส้นทาง ที่ก้าวและเดินไป</a:t>
+            </a:r>
+            <a:br/>
+            <a:r>
+              <a:t>ให้ทุกวันเวลาในชีวิต</a:t>
+            </a:r>
+            <a:br/>
+            <a:r>
+              <a:t>นมัสการพระองค์นิรันดร์</a:t>
             </a:r>
           </a:p>
         </p:txBody>
@@ -4520,23 +4313,27 @@
           <a:noFill/>
         </p:spPr>
         <p:txBody>
-          <a:bodyPr wrap="square">
+          <a:bodyPr wrap="none">
             <a:spAutoFit/>
           </a:bodyPr>
           <a:lstStyle/>
           <a:p>
             <a:pPr algn="ctr">
               <a:lnSpc>
-                <a:spcPts val="5500"/>
+                <a:spcPts val="4800"/>
               </a:lnSpc>
-              <a:defRPr sz="4600">
+              <a:defRPr sz="4000">
                 <a:solidFill>
                   <a:srgbClr val="000000"/>
                 </a:solidFill>
               </a:defRPr>
             </a:pPr>
             <a:r>
-              <a:t>**เรายกย่องพระนามพระองค์ เราสรรเสริญถึงความยิ่งใหญ่ ไม่มีใครสิ่งใดเท่าเทียม พระองค์ ผู้ทรงฤทธิ์เกรียงไกร</a:t>
+              <a:t>สรรเสริญพระนาม เถิดบรรดาผู้รับใช้พระเจ้าเอ๋ย</a:t>
+            </a:r>
+            <a:br/>
+            <a:r>
+              <a:t>จงสรรเสริญนามพระองค์</a:t>
             </a:r>
           </a:p>
         </p:txBody>
@@ -4558,35 +4355,23 @@
           <a:noFill/>
         </p:spPr>
         <p:txBody>
-          <a:bodyPr wrap="none">
+          <a:bodyPr wrap="square">
             <a:spAutoFit/>
           </a:bodyPr>
           <a:lstStyle/>
           <a:p>
             <a:pPr algn="ctr">
               <a:lnSpc>
-                <a:spcPts val="5500"/>
+                <a:spcPts val="4800"/>
               </a:lnSpc>
-              <a:defRPr sz="4400">
+              <a:defRPr sz="3500">
                 <a:solidFill>
                   <a:srgbClr val="3A70BC"/>
                 </a:solidFill>
               </a:defRPr>
             </a:pPr>
             <a:r>
-              <a:t>Lifting up Your precious Name</a:t>
-            </a:r>
-            <a:br/>
-            <a:r>
-              <a:t> We give praise to Your greatness</a:t>
-            </a:r>
-            <a:br/>
-            <a:r>
-              <a:t> There is none can be compared to You</a:t>
-            </a:r>
-            <a:br/>
-            <a:r>
-              <a:t> The almighty God.</a:t>
+              <a:t>Praise ye the Lord. Praise Him all ye servants of the Lord. Praise the name of the Lord.</a:t>
             </a:r>
           </a:p>
         </p:txBody>
@@ -4633,24 +4418,20 @@
           <a:p>
             <a:pPr algn="ctr">
               <a:lnSpc>
-                <a:spcPts val="5500"/>
+                <a:spcPts val="4800"/>
               </a:lnSpc>
-              <a:defRPr sz="4600">
+              <a:defRPr sz="4000">
                 <a:solidFill>
                   <a:srgbClr val="000000"/>
                 </a:solidFill>
               </a:defRPr>
             </a:pPr>
             <a:r>
-              <a:t>พระองค์ทรง ยุติธรรม ทรงรอบรู้ในทุกอย่าง</a:t>
-            </a:r>
-            <a:br/>
-            <a:r>
-              <a:t>พระปัญญาเหนือความเข้าใจ ฤทธิ์อำนาจของพระองค์</a:t>
-            </a:r>
-            <a:br/>
-            <a:r>
-              <a:t>ครอบครองอยู่เหนือโลกา</a:t>
+              <a:t>สาธุการพระนามแด่พระเจ้า</a:t>
+            </a:r>
+            <a:br/>
+            <a:r>
+              <a:t>ในกาลวันนี้และชั่วนิจนิรันดร์</a:t>
             </a:r>
           </a:p>
         </p:txBody>
@@ -4672,24 +4453,29 @@
           <a:noFill/>
         </p:spPr>
         <p:txBody>
-          <a:bodyPr wrap="square">
+          <a:bodyPr wrap="none">
             <a:spAutoFit/>
           </a:bodyPr>
           <a:lstStyle/>
           <a:p>
             <a:pPr algn="ctr">
               <a:lnSpc>
-                <a:spcPts val="5500"/>
+                <a:spcPts val="4800"/>
               </a:lnSpc>
-              <a:defRPr sz="4400">
+              <a:defRPr sz="3500">
                 <a:solidFill>
                   <a:srgbClr val="3A70BC"/>
                 </a:solidFill>
               </a:defRPr>
             </a:pPr>
             <a:r>
-              <a:t>He is just and upright insightful in all things. His wisdom beyond compare. The power of the Lord is ruling all the earth.</a:t>
-            </a:r>
+              <a:t>Blessed be the name of the Lord</a:t>
+            </a:r>
+            <a:br/>
+            <a:r>
+              <a:t> From this time forth and forever more</a:t>
+            </a:r>
+            <a:br/>
           </a:p>
         </p:txBody>
       </p:sp>
@@ -4713,88 +4499,49 @@
       <p:grpSpPr/>
       <p:sp>
         <p:nvSpPr>
-          <p:cNvPr id="2" name="TextBox 1"/>
-          <p:cNvSpPr txBox="1"/>
-          <p:nvPr/>
-        </p:nvSpPr>
-        <p:spPr>
-          <a:xfrm>
-            <a:off x="685800" y="228600"/>
-            <a:ext cx="7772400" cy="2971800"/>
-          </a:xfrm>
-          <a:prstGeom prst="rect">
-            <a:avLst/>
-          </a:prstGeom>
-          <a:noFill/>
-        </p:spPr>
-        <p:txBody>
-          <a:bodyPr wrap="square">
-            <a:spAutoFit/>
-          </a:bodyPr>
-          <a:lstStyle/>
-          <a:p>
-            <a:pPr algn="ctr">
-              <a:lnSpc>
-                <a:spcPts val="5500"/>
-              </a:lnSpc>
+          <p:cNvPr id="2" name="Title 1"/>
+          <p:cNvSpPr>
+            <a:spLocks noGrp="1"/>
+          </p:cNvSpPr>
+          <p:nvPr>
+            <p:ph type="ctrTitle"/>
+          </p:nvPr>
+        </p:nvSpPr>
+        <p:spPr/>
+        <p:txBody>
+          <a:bodyPr/>
+          <a:lstStyle/>
+          <a:p>
+            <a:r>
+              <a:t>ชั่วนิรันดร์</a:t>
+            </a:r>
+          </a:p>
+        </p:txBody>
+      </p:sp>
+      <p:sp>
+        <p:nvSpPr>
+          <p:cNvPr id="3" name="Subtitle 2"/>
+          <p:cNvSpPr>
+            <a:spLocks noGrp="1"/>
+          </p:cNvSpPr>
+          <p:nvPr>
+            <p:ph type="subTitle" idx="1"/>
+          </p:nvPr>
+        </p:nvSpPr>
+        <p:spPr/>
+        <p:txBody>
+          <a:bodyPr/>
+          <a:lstStyle/>
+          <a:p>
+            <a:pPr>
               <a:defRPr sz="4600">
-                <a:solidFill>
-                  <a:srgbClr val="000000"/>
-                </a:solidFill>
-              </a:defRPr>
-            </a:pPr>
-            <a:r>
-              <a:t>**เรายกย่องพระนามพระองค์ เราสรรเสริญถึงความยิ่งใหญ่ ไม่มีใครสิ่งใดเท่าเทียม พระองค์ ผู้ทรงฤทธิ์เกรียงไกร</a:t>
-            </a:r>
-          </a:p>
-        </p:txBody>
-      </p:sp>
-      <p:sp>
-        <p:nvSpPr>
-          <p:cNvPr id="3" name="TextBox 2"/>
-          <p:cNvSpPr txBox="1"/>
-          <p:nvPr/>
-        </p:nvSpPr>
-        <p:spPr>
-          <a:xfrm>
-            <a:off x="685800" y="3657600"/>
-            <a:ext cx="7772400" cy="2971800"/>
-          </a:xfrm>
-          <a:prstGeom prst="rect">
-            <a:avLst/>
-          </a:prstGeom>
-          <a:noFill/>
-        </p:spPr>
-        <p:txBody>
-          <a:bodyPr wrap="none">
-            <a:spAutoFit/>
-          </a:bodyPr>
-          <a:lstStyle/>
-          <a:p>
-            <a:pPr algn="ctr">
-              <a:lnSpc>
-                <a:spcPts val="5500"/>
-              </a:lnSpc>
-              <a:defRPr sz="4400">
                 <a:solidFill>
                   <a:srgbClr val="3A70BC"/>
                 </a:solidFill>
               </a:defRPr>
             </a:pPr>
             <a:r>
-              <a:t>Lifting up Your precious Name</a:t>
-            </a:r>
-            <a:br/>
-            <a:r>
-              <a:t> We give praise to Your greatness</a:t>
-            </a:r>
-            <a:br/>
-            <a:r>
-              <a:t> There is none can be compared to You</a:t>
-            </a:r>
-            <a:br/>
-            <a:r>
-              <a:t> The almighty God.</a:t>
+              <a:t>Forever</a:t>
             </a:r>
           </a:p>
         </p:txBody>
@@ -4841,25 +4588,22 @@
           <a:p>
             <a:pPr algn="ctr">
               <a:lnSpc>
-                <a:spcPts val="5500"/>
+                <a:spcPts val="4800"/>
               </a:lnSpc>
-              <a:defRPr sz="4600">
+              <a:defRPr sz="4000">
                 <a:solidFill>
                   <a:srgbClr val="000000"/>
                 </a:solidFill>
               </a:defRPr>
             </a:pPr>
             <a:r>
-              <a:t>***พระ สิริของพระองค์</a:t>
-            </a:r>
-            <a:br/>
-            <a:r>
-              <a:t>  ฤทธิ์อำนาจของพระองค์</a:t>
-            </a:r>
-            <a:br/>
-            <a:r>
-              <a:t>  ครอบครองอยู่เหนือโลกา</a:t>
-            </a:r>
+              <a:t>1. พระเจ้าจอมราชา</a:t>
+            </a:r>
+            <a:br/>
+            <a:r>
+              <a:t>เราโมทนา ความรักพระองค์ดำรงนิรันดร์</a:t>
+            </a:r>
+            <a:br/>
           </a:p>
         </p:txBody>
       </p:sp>
@@ -4887,24 +4631,20 @@
           <a:p>
             <a:pPr algn="ctr">
               <a:lnSpc>
-                <a:spcPts val="5500"/>
+                <a:spcPts val="4800"/>
               </a:lnSpc>
-              <a:defRPr sz="4400">
+              <a:defRPr sz="3500">
                 <a:solidFill>
                   <a:srgbClr val="3A70BC"/>
                 </a:solidFill>
               </a:defRPr>
             </a:pPr>
             <a:r>
-              <a:t>The glory of the Lord</a:t>
-            </a:r>
-            <a:br/>
-            <a:r>
-              <a:t> The power of the Lord</a:t>
-            </a:r>
-            <a:br/>
-            <a:r>
-              <a:t> Ruling above the earth</a:t>
+              <a:t>Give thanks to the Lord our God and King</a:t>
+            </a:r>
+            <a:br/>
+            <a:r>
+              <a:t> His love endures forever</a:t>
             </a:r>
             <a:br/>
           </a:p>
@@ -4930,50 +4670,94 @@
       <p:grpSpPr/>
       <p:sp>
         <p:nvSpPr>
-          <p:cNvPr id="2" name="Title 1"/>
-          <p:cNvSpPr>
-            <a:spLocks noGrp="1"/>
-          </p:cNvSpPr>
-          <p:nvPr>
-            <p:ph type="ctrTitle"/>
-          </p:nvPr>
-        </p:nvSpPr>
-        <p:spPr/>
-        <p:txBody>
-          <a:bodyPr/>
-          <a:lstStyle/>
-          <a:p>
-            <a:r>
-              <a:t>โดยอำนาจความรักพระองค์</a:t>
-            </a:r>
-          </a:p>
-        </p:txBody>
-      </p:sp>
-      <p:sp>
-        <p:nvSpPr>
-          <p:cNvPr id="3" name="Subtitle 2"/>
-          <p:cNvSpPr>
-            <a:spLocks noGrp="1"/>
-          </p:cNvSpPr>
-          <p:nvPr>
-            <p:ph type="subTitle" idx="1"/>
-          </p:nvPr>
-        </p:nvSpPr>
-        <p:spPr/>
-        <p:txBody>
-          <a:bodyPr/>
-          <a:lstStyle/>
-          <a:p>
-            <a:pPr>
+          <p:cNvPr id="2" name="TextBox 1"/>
+          <p:cNvSpPr txBox="1"/>
+          <p:nvPr/>
+        </p:nvSpPr>
+        <p:spPr>
+          <a:xfrm>
+            <a:off x="685800" y="228600"/>
+            <a:ext cx="7772400" cy="2971800"/>
+          </a:xfrm>
+          <a:prstGeom prst="rect">
+            <a:avLst/>
+          </a:prstGeom>
+          <a:noFill/>
+        </p:spPr>
+        <p:txBody>
+          <a:bodyPr wrap="none">
+            <a:spAutoFit/>
+          </a:bodyPr>
+          <a:lstStyle/>
+          <a:p>
+            <a:pPr algn="ctr">
+              <a:lnSpc>
+                <a:spcPts val="4800"/>
+              </a:lnSpc>
               <a:defRPr sz="4000">
+                <a:solidFill>
+                  <a:srgbClr val="000000"/>
+                </a:solidFill>
+              </a:defRPr>
+            </a:pPr>
+            <a:r>
+              <a:t>พระองค์ทรงดี และทรงอยู่เหนือทุกสิ่ง</a:t>
+            </a:r>
+            <a:br/>
+            <a:r>
+              <a:t>ความรักพระองค์ดำรงนิรันดร์</a:t>
+            </a:r>
+            <a:br/>
+            <a:r>
+              <a:t>เราร้อง สรรเสริญ</a:t>
+            </a:r>
+          </a:p>
+        </p:txBody>
+      </p:sp>
+      <p:sp>
+        <p:nvSpPr>
+          <p:cNvPr id="3" name="TextBox 2"/>
+          <p:cNvSpPr txBox="1"/>
+          <p:nvPr/>
+        </p:nvSpPr>
+        <p:spPr>
+          <a:xfrm>
+            <a:off x="685800" y="3657600"/>
+            <a:ext cx="7772400" cy="2971800"/>
+          </a:xfrm>
+          <a:prstGeom prst="rect">
+            <a:avLst/>
+          </a:prstGeom>
+          <a:noFill/>
+        </p:spPr>
+        <p:txBody>
+          <a:bodyPr wrap="none">
+            <a:spAutoFit/>
+          </a:bodyPr>
+          <a:lstStyle/>
+          <a:p>
+            <a:pPr algn="ctr">
+              <a:lnSpc>
+                <a:spcPts val="4800"/>
+              </a:lnSpc>
+              <a:defRPr sz="3500">
                 <a:solidFill>
                   <a:srgbClr val="3A70BC"/>
                 </a:solidFill>
               </a:defRPr>
             </a:pPr>
             <a:r>
-              <a:t>Power of Your Love </a:t>
-            </a:r>
+              <a:t>For He is good, He is above all things</a:t>
+            </a:r>
+            <a:br/>
+            <a:r>
+              <a:t> His love endures forever</a:t>
+            </a:r>
+            <a:br/>
+            <a:r>
+              <a:t> Sing praise, sing praise</a:t>
+            </a:r>
+            <a:br/>
           </a:p>
         </p:txBody>
       </p:sp>
@@ -5019,21 +4803,22 @@
           <a:p>
             <a:pPr algn="ctr">
               <a:lnSpc>
-                <a:spcPts val="5500"/>
+                <a:spcPts val="4800"/>
               </a:lnSpc>
-              <a:defRPr sz="4600">
+              <a:defRPr sz="4000">
                 <a:solidFill>
                   <a:srgbClr val="000000"/>
                 </a:solidFill>
               </a:defRPr>
             </a:pPr>
             <a:r>
-              <a:t>พระเจ้าข้า เข้ามา โปรดเปลี่ยนแปลงชีวิตหัวใจ</a:t>
-            </a:r>
-            <a:br/>
-            <a:r>
-              <a:t>โดยพระคุณที่ข้า ได้สัมผัสพระองค์</a:t>
-            </a:r>
+              <a:t>2. ด้วยพระหัตถ์ทรงฤทธิ์</a:t>
+            </a:r>
+            <a:br/>
+            <a:r>
+              <a:t>โอบล้อมชีวี ความรักพระองค์ดำรงนิรันดร์</a:t>
+            </a:r>
+            <a:br/>
           </a:p>
         </p:txBody>
       </p:sp>
@@ -5054,24 +4839,29 @@
           <a:noFill/>
         </p:spPr>
         <p:txBody>
-          <a:bodyPr wrap="square">
+          <a:bodyPr wrap="none">
             <a:spAutoFit/>
           </a:bodyPr>
           <a:lstStyle/>
           <a:p>
             <a:pPr algn="ctr">
               <a:lnSpc>
-                <a:spcPts val="5500"/>
+                <a:spcPts val="4800"/>
               </a:lnSpc>
-              <a:defRPr sz="4400">
+              <a:defRPr sz="3500">
                 <a:solidFill>
                   <a:srgbClr val="3A70BC"/>
                 </a:solidFill>
               </a:defRPr>
             </a:pPr>
             <a:r>
-              <a:t>Lord I come to You. Let my heart be changed, renewed. Flowing from the grace. That I found in You.</a:t>
-            </a:r>
+              <a:t>With a mighty hand and outstretched arm</a:t>
+            </a:r>
+            <a:br/>
+            <a:r>
+              <a:t> His love endures forever</a:t>
+            </a:r>
+            <a:br/>
           </a:p>
         </p:txBody>
       </p:sp>
@@ -5117,20 +4907,24 @@
           <a:p>
             <a:pPr algn="ctr">
               <a:lnSpc>
-                <a:spcPts val="5500"/>
+                <a:spcPts val="4800"/>
               </a:lnSpc>
-              <a:defRPr sz="4600">
+              <a:defRPr sz="4000">
                 <a:solidFill>
                   <a:srgbClr val="000000"/>
                 </a:solidFill>
               </a:defRPr>
             </a:pPr>
             <a:r>
-              <a:t>โอ้พระองค์ข้ารู้ดี จุดอ่อนภายในที่ข้ายังมี</a:t>
-            </a:r>
-            <a:br/>
-            <a:r>
-              <a:t>จะทรงลบล้างออกไป โดยอำนาจความรักพระองค์</a:t>
+              <a:t>ทรงประทาน (และ) ให้ชีวิตใหม่</a:t>
+            </a:r>
+            <a:br/>
+            <a:r>
+              <a:t>ความรักพระองค์ดำรงนิรันดร์</a:t>
+            </a:r>
+            <a:br/>
+            <a:r>
+              <a:t>เราร้อง สรรเสริญ</a:t>
             </a:r>
           </a:p>
         </p:txBody>
@@ -5152,24 +4946,33 @@
           <a:noFill/>
         </p:spPr>
         <p:txBody>
-          <a:bodyPr wrap="square">
+          <a:bodyPr wrap="none">
             <a:spAutoFit/>
           </a:bodyPr>
           <a:lstStyle/>
           <a:p>
             <a:pPr algn="ctr">
               <a:lnSpc>
-                <a:spcPts val="5500"/>
+                <a:spcPts val="4800"/>
               </a:lnSpc>
-              <a:defRPr sz="4400">
+              <a:defRPr sz="3500">
                 <a:solidFill>
                   <a:srgbClr val="3A70BC"/>
                 </a:solidFill>
               </a:defRPr>
             </a:pPr>
             <a:r>
-              <a:t>And Lord I've come to know. The weaknesses I see in me. Will be stripped away. By the power of Your love.</a:t>
-            </a:r>
+              <a:t>For the life that’s been reborn</a:t>
+            </a:r>
+            <a:br/>
+            <a:r>
+              <a:t> His love endures forever</a:t>
+            </a:r>
+            <a:br/>
+            <a:r>
+              <a:t> Sing praise, sing praise</a:t>
+            </a:r>
+            <a:br/>
           </a:p>
         </p:txBody>
       </p:sp>

</xml_diff>